<commit_message>
Add matrix to slide - thanks to May Rozen for the idea
</commit_message>
<xml_diff>
--- a/11-donor-coordination/slides.pptx
+++ b/11-donor-coordination/slides.pptx
@@ -9,10 +9,10 @@
     <p:sldMasterId id="2147483696" r:id="rId5"/>
   </p:sldMasterIdLst>
   <p:notesMasterIdLst>
-    <p:notesMasterId r:id="rId23"/>
+    <p:notesMasterId r:id="rId24"/>
   </p:notesMasterIdLst>
   <p:handoutMasterIdLst>
-    <p:handoutMasterId r:id="rId24"/>
+    <p:handoutMasterId r:id="rId25"/>
   </p:handoutMasterIdLst>
   <p:sldIdLst>
     <p:sldId id="256" r:id="rId6"/>
@@ -22,16 +22,17 @@
     <p:sldId id="260" r:id="rId10"/>
     <p:sldId id="261" r:id="rId11"/>
     <p:sldId id="262" r:id="rId12"/>
-    <p:sldId id="263" r:id="rId13"/>
-    <p:sldId id="264" r:id="rId14"/>
-    <p:sldId id="265" r:id="rId15"/>
-    <p:sldId id="266" r:id="rId16"/>
-    <p:sldId id="267" r:id="rId17"/>
-    <p:sldId id="268" r:id="rId18"/>
-    <p:sldId id="269" r:id="rId19"/>
-    <p:sldId id="270" r:id="rId20"/>
-    <p:sldId id="271" r:id="rId21"/>
-    <p:sldId id="272" r:id="rId22"/>
+    <p:sldId id="273" r:id="rId13"/>
+    <p:sldId id="263" r:id="rId14"/>
+    <p:sldId id="264" r:id="rId15"/>
+    <p:sldId id="265" r:id="rId16"/>
+    <p:sldId id="266" r:id="rId17"/>
+    <p:sldId id="267" r:id="rId18"/>
+    <p:sldId id="268" r:id="rId19"/>
+    <p:sldId id="269" r:id="rId20"/>
+    <p:sldId id="270" r:id="rId21"/>
+    <p:sldId id="271" r:id="rId22"/>
+    <p:sldId id="272" r:id="rId23"/>
   </p:sldIdLst>
   <p:sldSz cx="10080625" cy="7559675"/>
   <p:notesSz cx="7772400" cy="10058400"/>
@@ -896,7 +897,7 @@
           <p:cNvPr id="7" name="Slide Number Placeholder 6">
             <a:extLst>
               <a:ext uri="{FF2B5EF4-FFF2-40B4-BE49-F238E27FC236}">
-                <a16:creationId xmlns:a16="http://schemas.microsoft.com/office/drawing/2014/main" id="{DE0D926D-9DE3-351C-8621-EF0016B3C0E4}"/>
+                <a16:creationId xmlns:a16="http://schemas.microsoft.com/office/drawing/2014/main" id="{B3C95337-A395-20CD-6558-B67891CA1033}"/>
               </a:ext>
             </a:extLst>
           </p:cNvPr>
@@ -917,7 +918,7 @@
           <a:lstStyle/>
           <a:p>
             <a:pPr lvl="0"/>
-            <a:fld id="{1C28C4EB-B8F0-4069-BF2D-1ECCB11522B2}" type="slidenum">
+            <a:fld id="{0838F191-B6EE-4938-82D3-23CCC9508599}" type="slidenum">
               <a:t>10</a:t>
             </a:fld>
             <a:endParaRPr lang="en-US"/>
@@ -929,7 +930,7 @@
           <p:cNvPr id="2" name="Slide Image Placeholder 1">
             <a:extLst>
               <a:ext uri="{FF2B5EF4-FFF2-40B4-BE49-F238E27FC236}">
-                <a16:creationId xmlns:a16="http://schemas.microsoft.com/office/drawing/2014/main" id="{34ED839F-5D3B-1B4C-C808-2B0E815C78F6}"/>
+                <a16:creationId xmlns:a16="http://schemas.microsoft.com/office/drawing/2014/main" id="{3395CBA4-AF81-E180-8C05-B4431C95BC69}"/>
               </a:ext>
             </a:extLst>
           </p:cNvPr>
@@ -961,7 +962,7 @@
           <p:cNvPr id="3" name="Notes Placeholder 2">
             <a:extLst>
               <a:ext uri="{FF2B5EF4-FFF2-40B4-BE49-F238E27FC236}">
-                <a16:creationId xmlns:a16="http://schemas.microsoft.com/office/drawing/2014/main" id="{6E647C86-3DF7-93A5-71D7-30C4BF1328D1}"/>
+                <a16:creationId xmlns:a16="http://schemas.microsoft.com/office/drawing/2014/main" id="{CCFE0CF8-1DC0-C45C-BA15-EF624A318D72}"/>
               </a:ext>
             </a:extLst>
           </p:cNvPr>
@@ -1016,7 +1017,7 @@
           <p:cNvPr id="7" name="Slide Number Placeholder 6">
             <a:extLst>
               <a:ext uri="{FF2B5EF4-FFF2-40B4-BE49-F238E27FC236}">
-                <a16:creationId xmlns:a16="http://schemas.microsoft.com/office/drawing/2014/main" id="{4054BCB7-7CBF-ADA3-AB1A-566151B98512}"/>
+                <a16:creationId xmlns:a16="http://schemas.microsoft.com/office/drawing/2014/main" id="{DE0D926D-9DE3-351C-8621-EF0016B3C0E4}"/>
               </a:ext>
             </a:extLst>
           </p:cNvPr>
@@ -1037,7 +1038,7 @@
           <a:lstStyle/>
           <a:p>
             <a:pPr lvl="0"/>
-            <a:fld id="{43BAD0BB-81C1-4855-B3BC-569F17627E41}" type="slidenum">
+            <a:fld id="{1C28C4EB-B8F0-4069-BF2D-1ECCB11522B2}" type="slidenum">
               <a:t>11</a:t>
             </a:fld>
             <a:endParaRPr lang="en-US"/>
@@ -1049,7 +1050,7 @@
           <p:cNvPr id="2" name="Slide Image Placeholder 1">
             <a:extLst>
               <a:ext uri="{FF2B5EF4-FFF2-40B4-BE49-F238E27FC236}">
-                <a16:creationId xmlns:a16="http://schemas.microsoft.com/office/drawing/2014/main" id="{41B77CC1-978F-3C6C-7C45-DBAC8C984C06}"/>
+                <a16:creationId xmlns:a16="http://schemas.microsoft.com/office/drawing/2014/main" id="{34ED839F-5D3B-1B4C-C808-2B0E815C78F6}"/>
               </a:ext>
             </a:extLst>
           </p:cNvPr>
@@ -1081,7 +1082,7 @@
           <p:cNvPr id="3" name="Notes Placeholder 2">
             <a:extLst>
               <a:ext uri="{FF2B5EF4-FFF2-40B4-BE49-F238E27FC236}">
-                <a16:creationId xmlns:a16="http://schemas.microsoft.com/office/drawing/2014/main" id="{B08EA319-9CDA-948E-CF72-838A5BD73770}"/>
+                <a16:creationId xmlns:a16="http://schemas.microsoft.com/office/drawing/2014/main" id="{6E647C86-3DF7-93A5-71D7-30C4BF1328D1}"/>
               </a:ext>
             </a:extLst>
           </p:cNvPr>
@@ -1136,7 +1137,7 @@
           <p:cNvPr id="7" name="Slide Number Placeholder 6">
             <a:extLst>
               <a:ext uri="{FF2B5EF4-FFF2-40B4-BE49-F238E27FC236}">
-                <a16:creationId xmlns:a16="http://schemas.microsoft.com/office/drawing/2014/main" id="{71CE8CF5-ECC9-5177-DB7B-14C08D6886BF}"/>
+                <a16:creationId xmlns:a16="http://schemas.microsoft.com/office/drawing/2014/main" id="{4054BCB7-7CBF-ADA3-AB1A-566151B98512}"/>
               </a:ext>
             </a:extLst>
           </p:cNvPr>
@@ -1157,7 +1158,7 @@
           <a:lstStyle/>
           <a:p>
             <a:pPr lvl="0"/>
-            <a:fld id="{431C8832-1F14-487A-B411-CE96723F73EE}" type="slidenum">
+            <a:fld id="{43BAD0BB-81C1-4855-B3BC-569F17627E41}" type="slidenum">
               <a:t>12</a:t>
             </a:fld>
             <a:endParaRPr lang="en-US"/>
@@ -1169,7 +1170,7 @@
           <p:cNvPr id="2" name="Slide Image Placeholder 1">
             <a:extLst>
               <a:ext uri="{FF2B5EF4-FFF2-40B4-BE49-F238E27FC236}">
-                <a16:creationId xmlns:a16="http://schemas.microsoft.com/office/drawing/2014/main" id="{D538F203-97C2-F669-71C9-2816E9623006}"/>
+                <a16:creationId xmlns:a16="http://schemas.microsoft.com/office/drawing/2014/main" id="{41B77CC1-978F-3C6C-7C45-DBAC8C984C06}"/>
               </a:ext>
             </a:extLst>
           </p:cNvPr>
@@ -1201,7 +1202,7 @@
           <p:cNvPr id="3" name="Notes Placeholder 2">
             <a:extLst>
               <a:ext uri="{FF2B5EF4-FFF2-40B4-BE49-F238E27FC236}">
-                <a16:creationId xmlns:a16="http://schemas.microsoft.com/office/drawing/2014/main" id="{1709E2E7-AAC3-7787-F6BA-ADDC5E12EC08}"/>
+                <a16:creationId xmlns:a16="http://schemas.microsoft.com/office/drawing/2014/main" id="{B08EA319-9CDA-948E-CF72-838A5BD73770}"/>
               </a:ext>
             </a:extLst>
           </p:cNvPr>
@@ -1256,7 +1257,7 @@
           <p:cNvPr id="7" name="Slide Number Placeholder 6">
             <a:extLst>
               <a:ext uri="{FF2B5EF4-FFF2-40B4-BE49-F238E27FC236}">
-                <a16:creationId xmlns:a16="http://schemas.microsoft.com/office/drawing/2014/main" id="{9C33FD28-5751-B68D-CD91-BD685289C50C}"/>
+                <a16:creationId xmlns:a16="http://schemas.microsoft.com/office/drawing/2014/main" id="{71CE8CF5-ECC9-5177-DB7B-14C08D6886BF}"/>
               </a:ext>
             </a:extLst>
           </p:cNvPr>
@@ -1277,7 +1278,7 @@
           <a:lstStyle/>
           <a:p>
             <a:pPr lvl="0"/>
-            <a:fld id="{1BE45C68-5CFA-4112-8D77-A59401262513}" type="slidenum">
+            <a:fld id="{431C8832-1F14-487A-B411-CE96723F73EE}" type="slidenum">
               <a:t>13</a:t>
             </a:fld>
             <a:endParaRPr lang="en-US"/>
@@ -1289,7 +1290,7 @@
           <p:cNvPr id="2" name="Slide Image Placeholder 1">
             <a:extLst>
               <a:ext uri="{FF2B5EF4-FFF2-40B4-BE49-F238E27FC236}">
-                <a16:creationId xmlns:a16="http://schemas.microsoft.com/office/drawing/2014/main" id="{DCA8B5A2-EDBC-AC80-0092-291AAA16017C}"/>
+                <a16:creationId xmlns:a16="http://schemas.microsoft.com/office/drawing/2014/main" id="{D538F203-97C2-F669-71C9-2816E9623006}"/>
               </a:ext>
             </a:extLst>
           </p:cNvPr>
@@ -1321,7 +1322,7 @@
           <p:cNvPr id="3" name="Notes Placeholder 2">
             <a:extLst>
               <a:ext uri="{FF2B5EF4-FFF2-40B4-BE49-F238E27FC236}">
-                <a16:creationId xmlns:a16="http://schemas.microsoft.com/office/drawing/2014/main" id="{1361D562-F719-F74B-3345-A001C318153A}"/>
+                <a16:creationId xmlns:a16="http://schemas.microsoft.com/office/drawing/2014/main" id="{1709E2E7-AAC3-7787-F6BA-ADDC5E12EC08}"/>
               </a:ext>
             </a:extLst>
           </p:cNvPr>
@@ -1376,7 +1377,7 @@
           <p:cNvPr id="7" name="Slide Number Placeholder 6">
             <a:extLst>
               <a:ext uri="{FF2B5EF4-FFF2-40B4-BE49-F238E27FC236}">
-                <a16:creationId xmlns:a16="http://schemas.microsoft.com/office/drawing/2014/main" id="{B25DB9C9-7418-BECD-EFD7-B238F6632FA6}"/>
+                <a16:creationId xmlns:a16="http://schemas.microsoft.com/office/drawing/2014/main" id="{9C33FD28-5751-B68D-CD91-BD685289C50C}"/>
               </a:ext>
             </a:extLst>
           </p:cNvPr>
@@ -1397,7 +1398,7 @@
           <a:lstStyle/>
           <a:p>
             <a:pPr lvl="0"/>
-            <a:fld id="{CF032AEE-F1A4-4EFB-837E-F0B1A3915B7D}" type="slidenum">
+            <a:fld id="{1BE45C68-5CFA-4112-8D77-A59401262513}" type="slidenum">
               <a:t>14</a:t>
             </a:fld>
             <a:endParaRPr lang="en-US"/>
@@ -1409,7 +1410,7 @@
           <p:cNvPr id="2" name="Slide Image Placeholder 1">
             <a:extLst>
               <a:ext uri="{FF2B5EF4-FFF2-40B4-BE49-F238E27FC236}">
-                <a16:creationId xmlns:a16="http://schemas.microsoft.com/office/drawing/2014/main" id="{C8CF91E1-1912-5C08-DA91-196E6E347222}"/>
+                <a16:creationId xmlns:a16="http://schemas.microsoft.com/office/drawing/2014/main" id="{DCA8B5A2-EDBC-AC80-0092-291AAA16017C}"/>
               </a:ext>
             </a:extLst>
           </p:cNvPr>
@@ -1441,7 +1442,7 @@
           <p:cNvPr id="3" name="Notes Placeholder 2">
             <a:extLst>
               <a:ext uri="{FF2B5EF4-FFF2-40B4-BE49-F238E27FC236}">
-                <a16:creationId xmlns:a16="http://schemas.microsoft.com/office/drawing/2014/main" id="{8D1F4273-1D3E-B4F1-75B5-1C281E0B34C7}"/>
+                <a16:creationId xmlns:a16="http://schemas.microsoft.com/office/drawing/2014/main" id="{1361D562-F719-F74B-3345-A001C318153A}"/>
               </a:ext>
             </a:extLst>
           </p:cNvPr>
@@ -1496,7 +1497,7 @@
           <p:cNvPr id="7" name="Slide Number Placeholder 6">
             <a:extLst>
               <a:ext uri="{FF2B5EF4-FFF2-40B4-BE49-F238E27FC236}">
-                <a16:creationId xmlns:a16="http://schemas.microsoft.com/office/drawing/2014/main" id="{1EB9A63F-6AB2-A90F-F24A-2A2E8F88A280}"/>
+                <a16:creationId xmlns:a16="http://schemas.microsoft.com/office/drawing/2014/main" id="{B25DB9C9-7418-BECD-EFD7-B238F6632FA6}"/>
               </a:ext>
             </a:extLst>
           </p:cNvPr>
@@ -1517,7 +1518,7 @@
           <a:lstStyle/>
           <a:p>
             <a:pPr lvl="0"/>
-            <a:fld id="{D9A64EE8-CC8D-4110-BFE3-2DDE764F20E0}" type="slidenum">
+            <a:fld id="{CF032AEE-F1A4-4EFB-837E-F0B1A3915B7D}" type="slidenum">
               <a:t>15</a:t>
             </a:fld>
             <a:endParaRPr lang="en-US"/>
@@ -1529,7 +1530,7 @@
           <p:cNvPr id="2" name="Slide Image Placeholder 1">
             <a:extLst>
               <a:ext uri="{FF2B5EF4-FFF2-40B4-BE49-F238E27FC236}">
-                <a16:creationId xmlns:a16="http://schemas.microsoft.com/office/drawing/2014/main" id="{680802C2-EC15-59A5-C638-DDB847E01A55}"/>
+                <a16:creationId xmlns:a16="http://schemas.microsoft.com/office/drawing/2014/main" id="{C8CF91E1-1912-5C08-DA91-196E6E347222}"/>
               </a:ext>
             </a:extLst>
           </p:cNvPr>
@@ -1561,7 +1562,7 @@
           <p:cNvPr id="3" name="Notes Placeholder 2">
             <a:extLst>
               <a:ext uri="{FF2B5EF4-FFF2-40B4-BE49-F238E27FC236}">
-                <a16:creationId xmlns:a16="http://schemas.microsoft.com/office/drawing/2014/main" id="{86EA69FE-A4C0-DB4C-57FD-7247FEDA2DAE}"/>
+                <a16:creationId xmlns:a16="http://schemas.microsoft.com/office/drawing/2014/main" id="{8D1F4273-1D3E-B4F1-75B5-1C281E0B34C7}"/>
               </a:ext>
             </a:extLst>
           </p:cNvPr>
@@ -1616,7 +1617,7 @@
           <p:cNvPr id="7" name="Slide Number Placeholder 6">
             <a:extLst>
               <a:ext uri="{FF2B5EF4-FFF2-40B4-BE49-F238E27FC236}">
-                <a16:creationId xmlns:a16="http://schemas.microsoft.com/office/drawing/2014/main" id="{122B2CDF-72A4-2656-0ADC-69A0DBBF7438}"/>
+                <a16:creationId xmlns:a16="http://schemas.microsoft.com/office/drawing/2014/main" id="{1EB9A63F-6AB2-A90F-F24A-2A2E8F88A280}"/>
               </a:ext>
             </a:extLst>
           </p:cNvPr>
@@ -1637,7 +1638,7 @@
           <a:lstStyle/>
           <a:p>
             <a:pPr lvl="0"/>
-            <a:fld id="{70DD40EC-99E4-4A87-80FA-5959FAD654B4}" type="slidenum">
+            <a:fld id="{D9A64EE8-CC8D-4110-BFE3-2DDE764F20E0}" type="slidenum">
               <a:t>16</a:t>
             </a:fld>
             <a:endParaRPr lang="en-US"/>
@@ -1649,7 +1650,7 @@
           <p:cNvPr id="2" name="Slide Image Placeholder 1">
             <a:extLst>
               <a:ext uri="{FF2B5EF4-FFF2-40B4-BE49-F238E27FC236}">
-                <a16:creationId xmlns:a16="http://schemas.microsoft.com/office/drawing/2014/main" id="{5665CDC7-B263-1B34-C430-C3851E2D0A35}"/>
+                <a16:creationId xmlns:a16="http://schemas.microsoft.com/office/drawing/2014/main" id="{680802C2-EC15-59A5-C638-DDB847E01A55}"/>
               </a:ext>
             </a:extLst>
           </p:cNvPr>
@@ -1681,7 +1682,7 @@
           <p:cNvPr id="3" name="Notes Placeholder 2">
             <a:extLst>
               <a:ext uri="{FF2B5EF4-FFF2-40B4-BE49-F238E27FC236}">
-                <a16:creationId xmlns:a16="http://schemas.microsoft.com/office/drawing/2014/main" id="{641996A9-27E1-3437-AB5A-3E2DCA47ADE0}"/>
+                <a16:creationId xmlns:a16="http://schemas.microsoft.com/office/drawing/2014/main" id="{86EA69FE-A4C0-DB4C-57FD-7247FEDA2DAE}"/>
               </a:ext>
             </a:extLst>
           </p:cNvPr>
@@ -1736,7 +1737,7 @@
           <p:cNvPr id="7" name="Slide Number Placeholder 6">
             <a:extLst>
               <a:ext uri="{FF2B5EF4-FFF2-40B4-BE49-F238E27FC236}">
-                <a16:creationId xmlns:a16="http://schemas.microsoft.com/office/drawing/2014/main" id="{1F50F053-528F-B7DE-3434-A26034C67FCD}"/>
+                <a16:creationId xmlns:a16="http://schemas.microsoft.com/office/drawing/2014/main" id="{122B2CDF-72A4-2656-0ADC-69A0DBBF7438}"/>
               </a:ext>
             </a:extLst>
           </p:cNvPr>
@@ -1757,8 +1758,128 @@
           <a:lstStyle/>
           <a:p>
             <a:pPr lvl="0"/>
+            <a:fld id="{70DD40EC-99E4-4A87-80FA-5959FAD654B4}" type="slidenum">
+              <a:t>17</a:t>
+            </a:fld>
+            <a:endParaRPr lang="en-US"/>
+          </a:p>
+        </p:txBody>
+      </p:sp>
+      <p:sp>
+        <p:nvSpPr>
+          <p:cNvPr id="2" name="Slide Image Placeholder 1">
+            <a:extLst>
+              <a:ext uri="{FF2B5EF4-FFF2-40B4-BE49-F238E27FC236}">
+                <a16:creationId xmlns:a16="http://schemas.microsoft.com/office/drawing/2014/main" id="{5665CDC7-B263-1B34-C430-C3851E2D0A35}"/>
+              </a:ext>
+            </a:extLst>
+          </p:cNvPr>
+          <p:cNvSpPr>
+            <a:spLocks noGrp="1" noRot="1" noChangeAspect="1" noResize="1"/>
+          </p:cNvSpPr>
+          <p:nvPr>
+            <p:ph type="sldImg"/>
+          </p:nvPr>
+        </p:nvSpPr>
+        <p:spPr>
+          <a:xfrm>
+            <a:off x="1371600" y="763588"/>
+            <a:ext cx="5029200" cy="3771900"/>
+          </a:xfrm>
+          <a:solidFill>
+            <a:srgbClr val="729FCF"/>
+          </a:solidFill>
+          <a:ln w="25400">
+            <a:solidFill>
+              <a:srgbClr val="3465A4"/>
+            </a:solidFill>
+            <a:prstDash val="solid"/>
+          </a:ln>
+        </p:spPr>
+      </p:sp>
+      <p:sp>
+        <p:nvSpPr>
+          <p:cNvPr id="3" name="Notes Placeholder 2">
+            <a:extLst>
+              <a:ext uri="{FF2B5EF4-FFF2-40B4-BE49-F238E27FC236}">
+                <a16:creationId xmlns:a16="http://schemas.microsoft.com/office/drawing/2014/main" id="{641996A9-27E1-3437-AB5A-3E2DCA47ADE0}"/>
+              </a:ext>
+            </a:extLst>
+          </p:cNvPr>
+          <p:cNvSpPr txBox="1">
+            <a:spLocks noGrp="1"/>
+          </p:cNvSpPr>
+          <p:nvPr>
+            <p:ph type="body" sz="quarter" idx="1"/>
+          </p:nvPr>
+        </p:nvSpPr>
+        <p:spPr>
+          <a:xfrm>
+            <a:off x="777239" y="4777560"/>
+            <a:ext cx="6217560" cy="4525920"/>
+          </a:xfrm>
+        </p:spPr>
+        <p:txBody>
+          <a:bodyPr vert="horz"/>
+          <a:lstStyle/>
+          <a:p>
+            <a:endParaRPr lang="en-US"/>
+          </a:p>
+        </p:txBody>
+      </p:sp>
+    </p:spTree>
+  </p:cSld>
+  <p:clrMapOvr>
+    <a:masterClrMapping/>
+  </p:clrMapOvr>
+</p:notes>
+</file>
+
+<file path=ppt/notesSlides/notesSlide18.xml><?xml version="1.0" encoding="utf-8"?>
+<p:notes xmlns:a="http://schemas.openxmlformats.org/drawingml/2006/main" xmlns:r="http://schemas.openxmlformats.org/officeDocument/2006/relationships" xmlns:p="http://schemas.openxmlformats.org/presentationml/2006/main">
+  <p:cSld>
+    <p:spTree>
+      <p:nvGrpSpPr>
+        <p:cNvPr id="1" name=""/>
+        <p:cNvGrpSpPr/>
+        <p:nvPr/>
+      </p:nvGrpSpPr>
+      <p:grpSpPr>
+        <a:xfrm>
+          <a:off x="0" y="0"/>
+          <a:ext cx="0" cy="0"/>
+          <a:chOff x="0" y="0"/>
+          <a:chExt cx="0" cy="0"/>
+        </a:xfrm>
+      </p:grpSpPr>
+      <p:sp>
+        <p:nvSpPr>
+          <p:cNvPr id="7" name="Slide Number Placeholder 6">
+            <a:extLst>
+              <a:ext uri="{FF2B5EF4-FFF2-40B4-BE49-F238E27FC236}">
+                <a16:creationId xmlns:a16="http://schemas.microsoft.com/office/drawing/2014/main" id="{1F50F053-528F-B7DE-3434-A26034C67FCD}"/>
+              </a:ext>
+            </a:extLst>
+          </p:cNvPr>
+          <p:cNvSpPr txBox="1">
+            <a:spLocks noGrp="1"/>
+          </p:cNvSpPr>
+          <p:nvPr>
+            <p:ph type="sldNum" sz="quarter" idx="5"/>
+          </p:nvPr>
+        </p:nvSpPr>
+        <p:spPr>
+          <a:ln/>
+        </p:spPr>
+        <p:txBody>
+          <a:bodyPr vert="horz" lIns="0" tIns="0" rIns="0" bIns="0" anchor="b" anchorCtr="0">
+            <a:noAutofit/>
+          </a:bodyPr>
+          <a:lstStyle/>
+          <a:p>
+            <a:pPr lvl="0"/>
             <a:fld id="{6C8D5BC2-656F-4908-BDC2-13FBF95D85DE}" type="slidenum">
-              <a:t>17</a:t>
+              <a:t>18</a:t>
             </a:fld>
             <a:endParaRPr lang="en-US"/>
           </a:p>
@@ -2559,7 +2680,13 @@
   <p:cSld>
     <p:spTree>
       <p:nvGrpSpPr>
-        <p:cNvPr id="1" name=""/>
+        <p:cNvPr id="1" name="">
+          <a:extLst>
+            <a:ext uri="{FF2B5EF4-FFF2-40B4-BE49-F238E27FC236}">
+              <a16:creationId xmlns:a16="http://schemas.microsoft.com/office/drawing/2014/main" id="{96999BDC-02B8-6EE5-69F1-5C7172BB460F}"/>
+            </a:ext>
+          </a:extLst>
+        </p:cNvPr>
         <p:cNvGrpSpPr/>
         <p:nvPr/>
       </p:nvGrpSpPr>
@@ -2576,7 +2703,7 @@
           <p:cNvPr id="7" name="Slide Number Placeholder 6">
             <a:extLst>
               <a:ext uri="{FF2B5EF4-FFF2-40B4-BE49-F238E27FC236}">
-                <a16:creationId xmlns:a16="http://schemas.microsoft.com/office/drawing/2014/main" id="{7732E47A-4ACE-5D75-06FB-32632D4CF157}"/>
+                <a16:creationId xmlns:a16="http://schemas.microsoft.com/office/drawing/2014/main" id="{668D4DCD-E126-9A69-8D47-EE012ED07B1E}"/>
               </a:ext>
             </a:extLst>
           </p:cNvPr>
@@ -2597,7 +2724,7 @@
           <a:lstStyle/>
           <a:p>
             <a:pPr lvl="0"/>
-            <a:fld id="{F38BA16A-FD7F-4C1B-9E57-365F0C631997}" type="slidenum">
+            <a:fld id="{404F56CD-E5B7-46FC-8516-FF4907BAD4F0}" type="slidenum">
               <a:t>8</a:t>
             </a:fld>
             <a:endParaRPr lang="en-US"/>
@@ -2609,7 +2736,7 @@
           <p:cNvPr id="2" name="Slide Image Placeholder 1">
             <a:extLst>
               <a:ext uri="{FF2B5EF4-FFF2-40B4-BE49-F238E27FC236}">
-                <a16:creationId xmlns:a16="http://schemas.microsoft.com/office/drawing/2014/main" id="{06B5F826-4F9E-538A-DB29-4E9C6820E0A8}"/>
+                <a16:creationId xmlns:a16="http://schemas.microsoft.com/office/drawing/2014/main" id="{1D34BDE6-618A-197B-61DA-038A4C5637B4}"/>
               </a:ext>
             </a:extLst>
           </p:cNvPr>
@@ -2641,7 +2768,7 @@
           <p:cNvPr id="3" name="Notes Placeholder 2">
             <a:extLst>
               <a:ext uri="{FF2B5EF4-FFF2-40B4-BE49-F238E27FC236}">
-                <a16:creationId xmlns:a16="http://schemas.microsoft.com/office/drawing/2014/main" id="{7511DCF8-98CB-6FDD-55E8-FA09CEC6B4AF}"/>
+                <a16:creationId xmlns:a16="http://schemas.microsoft.com/office/drawing/2014/main" id="{A8E61DE9-A495-CD01-AAEB-D41682055CAD}"/>
               </a:ext>
             </a:extLst>
           </p:cNvPr>
@@ -2667,6 +2794,11 @@
         </p:txBody>
       </p:sp>
     </p:spTree>
+    <p:extLst>
+      <p:ext uri="{BB962C8B-B14F-4D97-AF65-F5344CB8AC3E}">
+        <p14:creationId xmlns:p14="http://schemas.microsoft.com/office/powerpoint/2010/main" val="781186114"/>
+      </p:ext>
+    </p:extLst>
   </p:cSld>
   <p:clrMapOvr>
     <a:masterClrMapping/>
@@ -2696,7 +2828,7 @@
           <p:cNvPr id="7" name="Slide Number Placeholder 6">
             <a:extLst>
               <a:ext uri="{FF2B5EF4-FFF2-40B4-BE49-F238E27FC236}">
-                <a16:creationId xmlns:a16="http://schemas.microsoft.com/office/drawing/2014/main" id="{B3C95337-A395-20CD-6558-B67891CA1033}"/>
+                <a16:creationId xmlns:a16="http://schemas.microsoft.com/office/drawing/2014/main" id="{7732E47A-4ACE-5D75-06FB-32632D4CF157}"/>
               </a:ext>
             </a:extLst>
           </p:cNvPr>
@@ -2717,7 +2849,7 @@
           <a:lstStyle/>
           <a:p>
             <a:pPr lvl="0"/>
-            <a:fld id="{0838F191-B6EE-4938-82D3-23CCC9508599}" type="slidenum">
+            <a:fld id="{F38BA16A-FD7F-4C1B-9E57-365F0C631997}" type="slidenum">
               <a:t>9</a:t>
             </a:fld>
             <a:endParaRPr lang="en-US"/>
@@ -2729,7 +2861,7 @@
           <p:cNvPr id="2" name="Slide Image Placeholder 1">
             <a:extLst>
               <a:ext uri="{FF2B5EF4-FFF2-40B4-BE49-F238E27FC236}">
-                <a16:creationId xmlns:a16="http://schemas.microsoft.com/office/drawing/2014/main" id="{3395CBA4-AF81-E180-8C05-B4431C95BC69}"/>
+                <a16:creationId xmlns:a16="http://schemas.microsoft.com/office/drawing/2014/main" id="{06B5F826-4F9E-538A-DB29-4E9C6820E0A8}"/>
               </a:ext>
             </a:extLst>
           </p:cNvPr>
@@ -2761,7 +2893,7 @@
           <p:cNvPr id="3" name="Notes Placeholder 2">
             <a:extLst>
               <a:ext uri="{FF2B5EF4-FFF2-40B4-BE49-F238E27FC236}">
-                <a16:creationId xmlns:a16="http://schemas.microsoft.com/office/drawing/2014/main" id="{CCFE0CF8-1DC0-C45C-BA15-EF624A318D72}"/>
+                <a16:creationId xmlns:a16="http://schemas.microsoft.com/office/drawing/2014/main" id="{7511DCF8-98CB-6FDD-55E8-FA09CEC6B4AF}"/>
               </a:ext>
             </a:extLst>
           </p:cNvPr>
@@ -17644,7 +17776,7 @@
 
 <file path=ppt/slides/slide10.xml><?xml version="1.0" encoding="utf-8"?>
 <p:sld xmlns:a="http://schemas.openxmlformats.org/drawingml/2006/main" xmlns:r="http://schemas.openxmlformats.org/officeDocument/2006/relationships" xmlns:p="http://schemas.openxmlformats.org/presentationml/2006/main">
-  <p:cSld name="page10">
+  <p:cSld name="page9">
     <p:spTree>
       <p:nvGrpSpPr>
         <p:cNvPr id="1" name=""/>
@@ -17661,10 +17793,10 @@
       </p:grpSpPr>
       <p:sp>
         <p:nvSpPr>
-          <p:cNvPr id="2" name="Title 1_8">
-            <a:extLst>
-              <a:ext uri="{FF2B5EF4-FFF2-40B4-BE49-F238E27FC236}">
-                <a16:creationId xmlns:a16="http://schemas.microsoft.com/office/drawing/2014/main" id="{1664740B-9466-E37C-9903-9D33B67A8713}"/>
+          <p:cNvPr id="2" name="Title 1">
+            <a:extLst>
+              <a:ext uri="{FF2B5EF4-FFF2-40B4-BE49-F238E27FC236}">
+                <a16:creationId xmlns:a16="http://schemas.microsoft.com/office/drawing/2014/main" id="{A71EC15D-F6DD-0D96-0ACC-DF963B29AFC6}"/>
               </a:ext>
             </a:extLst>
           </p:cNvPr>
@@ -17700,17 +17832,17 @@
                 <a:latin typeface="Liberation Sans" pitchFamily="34"/>
                 <a:cs typeface="Liberation Sans" pitchFamily="34"/>
               </a:rPr>
-              <a:t>תקציב נאש - פריקוּת</a:t>
+              <a:t>אלגוריתם נאש – מיקסום המכפלה</a:t>
             </a:r>
           </a:p>
         </p:txBody>
       </p:sp>
       <p:sp>
         <p:nvSpPr>
-          <p:cNvPr id="3" name="Content Placeholder 2_7">
-            <a:extLst>
-              <a:ext uri="{FF2B5EF4-FFF2-40B4-BE49-F238E27FC236}">
-                <a16:creationId xmlns:a16="http://schemas.microsoft.com/office/drawing/2014/main" id="{803C5344-CF19-A755-9B28-E035C3034F62}"/>
+          <p:cNvPr id="3" name="Content Placeholder 2">
+            <a:extLst>
+              <a:ext uri="{FF2B5EF4-FFF2-40B4-BE49-F238E27FC236}">
+                <a16:creationId xmlns:a16="http://schemas.microsoft.com/office/drawing/2014/main" id="{151BA45C-08F8-6ADD-7093-1A0E563D70D8}"/>
               </a:ext>
             </a:extLst>
           </p:cNvPr>
@@ -17765,6 +17897,1030 @@
           <p:cNvPr id="4" name="TextBox 3">
             <a:extLst>
               <a:ext uri="{FF2B5EF4-FFF2-40B4-BE49-F238E27FC236}">
+                <a16:creationId xmlns:a16="http://schemas.microsoft.com/office/drawing/2014/main" id="{BF0EC652-E463-4888-D8B6-A259326BF5F0}"/>
+              </a:ext>
+            </a:extLst>
+          </p:cNvPr>
+          <p:cNvSpPr txBox="1"/>
+          <p:nvPr/>
+        </p:nvSpPr>
+        <p:spPr>
+          <a:xfrm>
+            <a:off x="193992" y="839648"/>
+            <a:ext cx="9692640" cy="6844587"/>
+          </a:xfrm>
+          <a:prstGeom prst="rect">
+            <a:avLst/>
+          </a:prstGeom>
+          <a:noFill/>
+          <a:ln>
+            <a:noFill/>
+          </a:ln>
+        </p:spPr>
+        <p:txBody>
+          <a:bodyPr vert="horz" wrap="square" lIns="90000" tIns="45000" rIns="90000" bIns="45000" anchorCtr="0" compatLnSpc="0">
+            <a:spAutoFit/>
+          </a:bodyPr>
+          <a:lstStyle/>
+          <a:p>
+            <a:pPr marL="0" marR="0" lvl="0" indent="0" algn="r" rtl="1" hangingPunct="0">
+              <a:lnSpc>
+                <a:spcPct val="100000"/>
+              </a:lnSpc>
+              <a:spcBef>
+                <a:spcPts val="0"/>
+              </a:spcBef>
+              <a:spcAft>
+                <a:spcPts val="0"/>
+              </a:spcAft>
+              <a:buNone/>
+              <a:tabLst/>
+            </a:pPr>
+            <a:r>
+              <a:rPr lang="he-IL" sz="4000" b="1" i="0" u="none" strike="noStrike" kern="1200" cap="none">
+                <a:ln>
+                  <a:noFill/>
+                </a:ln>
+                <a:latin typeface="Liberation Sans" pitchFamily="34"/>
+                <a:ea typeface="Noto Sans CJK SC Regular" pitchFamily="2"/>
+                <a:cs typeface="Liberation Sans" pitchFamily="34"/>
+              </a:rPr>
+              <a:t>הגדרה. </a:t>
+            </a:r>
+            <a:r>
+              <a:rPr lang="he-IL" sz="4000" b="0" i="1" u="none" strike="noStrike" kern="1200" cap="none">
+                <a:ln>
+                  <a:noFill/>
+                </a:ln>
+                <a:latin typeface="Liberation Sans" pitchFamily="34"/>
+                <a:ea typeface="Noto Sans CJK SC Regular" pitchFamily="2"/>
+                <a:cs typeface="Liberation Sans" pitchFamily="34"/>
+              </a:rPr>
+              <a:t>תקציב נאש </a:t>
+            </a:r>
+            <a:r>
+              <a:rPr lang="he-IL" sz="4000" b="0" i="0" u="none" strike="noStrike" kern="1200" cap="none">
+                <a:ln>
+                  <a:noFill/>
+                </a:ln>
+                <a:latin typeface="Liberation Sans" pitchFamily="34"/>
+                <a:ea typeface="Noto Sans CJK SC Regular" pitchFamily="2"/>
+                <a:cs typeface="Liberation Sans" pitchFamily="34"/>
+              </a:rPr>
+              <a:t>הוא תקציב הממקסם את </a:t>
+            </a:r>
+            <a:r>
+              <a:rPr lang="he-IL" sz="4000" b="0" i="1" u="none" strike="noStrike" kern="1200" cap="none">
+                <a:ln>
+                  <a:noFill/>
+                </a:ln>
+                <a:latin typeface="Liberation Sans" pitchFamily="34"/>
+                <a:ea typeface="Noto Sans CJK SC Regular" pitchFamily="2"/>
+                <a:cs typeface="Liberation Sans" pitchFamily="34"/>
+              </a:rPr>
+              <a:t>מכפלת התועלות </a:t>
+            </a:r>
+            <a:r>
+              <a:rPr lang="he-IL" sz="4000" b="0" i="0" u="none" strike="noStrike" kern="1200" cap="none">
+                <a:ln>
+                  <a:noFill/>
+                </a:ln>
+                <a:latin typeface="Liberation Sans" pitchFamily="34"/>
+                <a:ea typeface="Noto Sans CJK SC Regular" pitchFamily="2"/>
+                <a:cs typeface="Liberation Sans" pitchFamily="34"/>
+              </a:rPr>
+              <a:t>של האזרחים:</a:t>
+            </a:r>
+          </a:p>
+          <a:p>
+            <a:pPr marL="0" marR="0" lvl="0" indent="0" algn="l" rtl="0" hangingPunct="0">
+              <a:lnSpc>
+                <a:spcPct val="100000"/>
+              </a:lnSpc>
+              <a:spcBef>
+                <a:spcPts val="0"/>
+              </a:spcBef>
+              <a:spcAft>
+                <a:spcPts val="0"/>
+              </a:spcAft>
+              <a:buNone/>
+              <a:tabLst/>
+            </a:pPr>
+            <a:r>
+              <a:rPr lang="en-US" sz="4000" b="0" i="0" u="none" strike="noStrike" kern="1200" cap="none" baseline="2000">
+                <a:ln>
+                  <a:noFill/>
+                </a:ln>
+                <a:latin typeface="Liberation Sans" pitchFamily="34"/>
+                <a:ea typeface="David CLM" pitchFamily="2"/>
+                <a:cs typeface="Liberation Sans" pitchFamily="34"/>
+              </a:rPr>
+              <a:t>max[d]  product[i]  u</a:t>
+            </a:r>
+            <a:r>
+              <a:rPr lang="en-US" sz="4000" b="0" i="0" u="none" strike="noStrike" kern="1200" cap="none" baseline="-7000">
+                <a:ln>
+                  <a:noFill/>
+                </a:ln>
+                <a:latin typeface="Liberation Sans" pitchFamily="34"/>
+                <a:ea typeface="David CLM" pitchFamily="2"/>
+                <a:cs typeface="Liberation Sans" pitchFamily="34"/>
+              </a:rPr>
+              <a:t>i</a:t>
+            </a:r>
+            <a:r>
+              <a:rPr lang="en-US" sz="4000" b="0" i="0" u="none" strike="noStrike" kern="1200" cap="none" baseline="2000">
+                <a:ln>
+                  <a:noFill/>
+                </a:ln>
+                <a:latin typeface="Liberation Sans" pitchFamily="34"/>
+                <a:ea typeface="David CLM" pitchFamily="2"/>
+                <a:cs typeface="Liberation Sans" pitchFamily="34"/>
+              </a:rPr>
+              <a:t>(d).</a:t>
+            </a:r>
+          </a:p>
+          <a:p>
+            <a:pPr marL="571500" marR="0" lvl="0" indent="-571500" algn="r" rtl="1" hangingPunct="0">
+              <a:lnSpc>
+                <a:spcPct val="100000"/>
+              </a:lnSpc>
+              <a:spcBef>
+                <a:spcPts val="0"/>
+              </a:spcBef>
+              <a:spcAft>
+                <a:spcPts val="0"/>
+              </a:spcAft>
+              <a:buSzPct val="45000"/>
+              <a:buFont typeface="Arial" panose="020B0604020202020204" pitchFamily="34" charset="0"/>
+              <a:buChar char="•"/>
+              <a:tabLst/>
+            </a:pPr>
+            <a:r>
+              <a:rPr lang="he-IL" sz="4000" b="0" i="1" u="none" strike="noStrike" kern="1200" cap="none" baseline="2000">
+                <a:ln>
+                  <a:noFill/>
+                </a:ln>
+                <a:solidFill>
+                  <a:srgbClr val="9933FF"/>
+                </a:solidFill>
+                <a:latin typeface="Liberation Sans" pitchFamily="34"/>
+                <a:ea typeface="David CLM" pitchFamily="2"/>
+                <a:cs typeface="Liberation Sans" pitchFamily="34"/>
+              </a:rPr>
+              <a:t>הגדרה שקולה</a:t>
+            </a:r>
+            <a:r>
+              <a:rPr lang="he-IL" sz="4000" b="0" i="0" u="none" strike="noStrike" kern="1200" cap="none" baseline="2000">
+                <a:ln>
+                  <a:noFill/>
+                </a:ln>
+                <a:solidFill>
+                  <a:srgbClr val="9933FF"/>
+                </a:solidFill>
+                <a:latin typeface="Liberation Sans" pitchFamily="34"/>
+                <a:ea typeface="David CLM" pitchFamily="2"/>
+                <a:cs typeface="Liberation Sans" pitchFamily="34"/>
+              </a:rPr>
+              <a:t>: </a:t>
+            </a:r>
+            <a:r>
+              <a:rPr lang="en-US" sz="4000" b="0" i="0" u="none" strike="noStrike" kern="1200" cap="none" baseline="2000">
+                <a:ln>
+                  <a:noFill/>
+                </a:ln>
+                <a:solidFill>
+                  <a:srgbClr val="9933FF"/>
+                </a:solidFill>
+                <a:latin typeface="Liberation Sans" pitchFamily="34"/>
+                <a:ea typeface="David CLM" pitchFamily="2"/>
+                <a:cs typeface="Liberation Sans" pitchFamily="34"/>
+              </a:rPr>
+              <a:t>מיקסום סכום הלוגריתמים:</a:t>
+            </a:r>
+          </a:p>
+          <a:p>
+            <a:pPr marL="571500" marR="0" lvl="0" indent="-571500" algn="r" rtl="1" hangingPunct="0">
+              <a:lnSpc>
+                <a:spcPct val="100000"/>
+              </a:lnSpc>
+              <a:spcBef>
+                <a:spcPts val="0"/>
+              </a:spcBef>
+              <a:spcAft>
+                <a:spcPts val="0"/>
+              </a:spcAft>
+              <a:buFont typeface="Arial" panose="020B0604020202020204" pitchFamily="34" charset="0"/>
+              <a:buChar char="•"/>
+              <a:tabLst/>
+            </a:pPr>
+            <a:r>
+              <a:rPr lang="en-US" sz="4000" b="0" i="0" u="none" strike="noStrike" kern="1200" cap="none" baseline="2000">
+                <a:ln>
+                  <a:noFill/>
+                </a:ln>
+                <a:solidFill>
+                  <a:srgbClr val="9933FF"/>
+                </a:solidFill>
+                <a:latin typeface="Liberation Sans" pitchFamily="34"/>
+                <a:ea typeface="David CLM" pitchFamily="2"/>
+                <a:cs typeface="Liberation Sans" pitchFamily="34"/>
+              </a:rPr>
+              <a:t>max[d] sum[i] log(u</a:t>
+            </a:r>
+            <a:r>
+              <a:rPr lang="en-US" sz="4000" b="0" i="0" u="none" strike="noStrike" kern="1200" cap="none" baseline="-7000">
+                <a:ln>
+                  <a:noFill/>
+                </a:ln>
+                <a:solidFill>
+                  <a:srgbClr val="9933FF"/>
+                </a:solidFill>
+                <a:latin typeface="Liberation Sans" pitchFamily="34"/>
+                <a:ea typeface="David CLM" pitchFamily="2"/>
+                <a:cs typeface="Liberation Sans" pitchFamily="34"/>
+              </a:rPr>
+              <a:t>i</a:t>
+            </a:r>
+            <a:r>
+              <a:rPr lang="en-US" sz="4000" b="0" i="0" u="none" strike="noStrike" kern="1200" cap="none" baseline="2000">
+                <a:ln>
+                  <a:noFill/>
+                </a:ln>
+                <a:solidFill>
+                  <a:srgbClr val="9933FF"/>
+                </a:solidFill>
+                <a:latin typeface="Liberation Sans" pitchFamily="34"/>
+                <a:ea typeface="David CLM" pitchFamily="2"/>
+                <a:cs typeface="Liberation Sans" pitchFamily="34"/>
+              </a:rPr>
+              <a:t>(d))</a:t>
+            </a:r>
+            <a:r>
+              <a:rPr lang="he-IL" sz="4000" b="0" i="0" u="none" strike="noStrike" kern="1200" cap="none" baseline="2000">
+                <a:ln>
+                  <a:noFill/>
+                </a:ln>
+                <a:solidFill>
+                  <a:srgbClr val="9933FF"/>
+                </a:solidFill>
+                <a:latin typeface="Liberation Sans" pitchFamily="34"/>
+                <a:ea typeface="David CLM" pitchFamily="2"/>
+                <a:cs typeface="Liberation Sans" pitchFamily="34"/>
+              </a:rPr>
+              <a:t>.</a:t>
+            </a:r>
+            <a:endParaRPr lang="en-US" sz="4000" b="0" i="0" u="none" strike="noStrike" kern="1200" cap="none" baseline="2000">
+              <a:ln>
+                <a:noFill/>
+              </a:ln>
+              <a:solidFill>
+                <a:srgbClr val="9933FF"/>
+              </a:solidFill>
+              <a:latin typeface="Liberation Sans" pitchFamily="34"/>
+              <a:ea typeface="David CLM" pitchFamily="2"/>
+              <a:cs typeface="Liberation Sans" pitchFamily="34"/>
+            </a:endParaRPr>
+          </a:p>
+          <a:p>
+            <a:pPr marL="571500" marR="0" lvl="0" indent="-571500" algn="r" rtl="1" hangingPunct="0">
+              <a:lnSpc>
+                <a:spcPct val="100000"/>
+              </a:lnSpc>
+              <a:spcBef>
+                <a:spcPts val="0"/>
+              </a:spcBef>
+              <a:spcAft>
+                <a:spcPts val="0"/>
+              </a:spcAft>
+              <a:buSzPct val="45000"/>
+              <a:buFont typeface="Arial" panose="020B0604020202020204" pitchFamily="34" charset="0"/>
+              <a:buChar char="•"/>
+              <a:tabLst/>
+            </a:pPr>
+            <a:r>
+              <a:rPr lang="he-IL" sz="4000" b="0" i="1" u="none" strike="noStrike" kern="1200" cap="none">
+                <a:ln>
+                  <a:noFill/>
+                </a:ln>
+                <a:solidFill>
+                  <a:srgbClr val="0066FF"/>
+                </a:solidFill>
+                <a:latin typeface="Liberation Sans" pitchFamily="34"/>
+                <a:ea typeface="Noto Sans CJK SC Regular" pitchFamily="2"/>
+                <a:cs typeface="Liberation Sans" pitchFamily="34"/>
+              </a:rPr>
+              <a:t>חישוב</a:t>
+            </a:r>
+            <a:r>
+              <a:rPr lang="he-IL" sz="4000" b="0" i="0" u="none" strike="noStrike" kern="1200" cap="none">
+                <a:ln>
+                  <a:noFill/>
+                </a:ln>
+                <a:solidFill>
+                  <a:srgbClr val="0066FF"/>
+                </a:solidFill>
+                <a:latin typeface="Liberation Sans" pitchFamily="34"/>
+                <a:ea typeface="Noto Sans CJK SC Regular" pitchFamily="2"/>
+                <a:cs typeface="Liberation Sans" pitchFamily="34"/>
+              </a:rPr>
+              <a:t>:</a:t>
+            </a:r>
+            <a:r>
+              <a:rPr lang="en-US" sz="4000" b="0" i="0" u="none" strike="noStrike" kern="1200" cap="none">
+                <a:ln>
+                  <a:noFill/>
+                </a:ln>
+                <a:solidFill>
+                  <a:srgbClr val="0066FF"/>
+                </a:solidFill>
+                <a:latin typeface="Liberation Sans" pitchFamily="34"/>
+                <a:ea typeface="Noto Sans CJK SC Regular" pitchFamily="2"/>
+                <a:cs typeface="Liberation Sans" pitchFamily="34"/>
+              </a:rPr>
+              <a:t> פתרון בעיית אופטימיזציה קמורה – ראו בתיקיית הקוד.</a:t>
+            </a:r>
+          </a:p>
+          <a:p>
+            <a:pPr marL="0" marR="0" lvl="0" indent="0" algn="r" rtl="1" hangingPunct="0">
+              <a:lnSpc>
+                <a:spcPct val="100000"/>
+              </a:lnSpc>
+              <a:spcBef>
+                <a:spcPts val="0"/>
+              </a:spcBef>
+              <a:spcAft>
+                <a:spcPts val="0"/>
+              </a:spcAft>
+              <a:buNone/>
+              <a:tabLst/>
+            </a:pPr>
+            <a:endParaRPr lang="en-US" sz="1800" b="0" i="0" u="none" strike="noStrike" kern="1200" cap="none">
+              <a:ln>
+                <a:noFill/>
+              </a:ln>
+              <a:latin typeface="Liberation Sans" pitchFamily="18"/>
+              <a:ea typeface="Noto Sans CJK SC Regular" pitchFamily="2"/>
+              <a:cs typeface="Nachlieli CLM" pitchFamily="2"/>
+            </a:endParaRPr>
+          </a:p>
+          <a:p>
+            <a:pPr marL="0" marR="0" lvl="0" indent="0" algn="r" rtl="1" hangingPunct="0">
+              <a:lnSpc>
+                <a:spcPct val="100000"/>
+              </a:lnSpc>
+              <a:spcBef>
+                <a:spcPts val="0"/>
+              </a:spcBef>
+              <a:spcAft>
+                <a:spcPts val="0"/>
+              </a:spcAft>
+              <a:buNone/>
+              <a:tabLst/>
+            </a:pPr>
+            <a:r>
+              <a:rPr lang="he-IL" sz="4000" b="1" i="0" u="none" strike="noStrike" kern="1200" cap="none">
+                <a:ln>
+                  <a:noFill/>
+                </a:ln>
+                <a:solidFill>
+                  <a:srgbClr val="00CC00"/>
+                </a:solidFill>
+                <a:latin typeface="Liberation Sans" pitchFamily="34"/>
+                <a:ea typeface="Noto Sans CJK SC Regular" pitchFamily="2"/>
+                <a:cs typeface="Liberation Sans" pitchFamily="34"/>
+              </a:rPr>
+              <a:t>משפט</a:t>
+            </a:r>
+            <a:r>
+              <a:rPr lang="he-IL" sz="4000" b="0" i="0" u="none" strike="noStrike" kern="1200" cap="none">
+                <a:ln>
+                  <a:noFill/>
+                </a:ln>
+                <a:solidFill>
+                  <a:srgbClr val="00CC00"/>
+                </a:solidFill>
+                <a:latin typeface="Liberation Sans" pitchFamily="34"/>
+                <a:ea typeface="Noto Sans CJK SC Regular" pitchFamily="2"/>
+                <a:cs typeface="Liberation Sans" pitchFamily="34"/>
+              </a:rPr>
+              <a:t>. </a:t>
+            </a:r>
+            <a:r>
+              <a:rPr lang="en-US" sz="4000" b="0" i="0" u="none" strike="noStrike" kern="1200" cap="none">
+                <a:ln>
+                  <a:noFill/>
+                </a:ln>
+                <a:solidFill>
+                  <a:srgbClr val="00CC00"/>
+                </a:solidFill>
+                <a:latin typeface="Liberation Sans" pitchFamily="34"/>
+                <a:ea typeface="Noto Sans CJK SC Regular" pitchFamily="2"/>
+                <a:cs typeface="Liberation Sans" pitchFamily="34"/>
+              </a:rPr>
+              <a:t>כל תקציב נאש הוא יעיל-פארטו.</a:t>
+            </a:r>
+          </a:p>
+          <a:p>
+            <a:pPr marL="0" marR="0" lvl="0" indent="0" algn="r" rtl="1" hangingPunct="0">
+              <a:lnSpc>
+                <a:spcPct val="100000"/>
+              </a:lnSpc>
+              <a:spcBef>
+                <a:spcPts val="0"/>
+              </a:spcBef>
+              <a:spcAft>
+                <a:spcPts val="0"/>
+              </a:spcAft>
+              <a:buNone/>
+              <a:tabLst/>
+            </a:pPr>
+            <a:r>
+              <a:rPr lang="he-IL" sz="4000" b="0" i="1" u="none" strike="noStrike" kern="1200" cap="none">
+                <a:ln>
+                  <a:noFill/>
+                </a:ln>
+                <a:latin typeface="Liberation Sans" pitchFamily="34"/>
+                <a:ea typeface="David CLM" pitchFamily="2"/>
+                <a:cs typeface="Liberation Sans" pitchFamily="34"/>
+              </a:rPr>
+              <a:t>הוכחה</a:t>
+            </a:r>
+            <a:r>
+              <a:rPr lang="en-US" sz="4000" b="0" i="0" u="none" strike="noStrike" kern="1200" cap="none">
+                <a:ln>
+                  <a:noFill/>
+                </a:ln>
+                <a:latin typeface="Liberation Sans" pitchFamily="34"/>
+                <a:ea typeface="David CLM" pitchFamily="2"/>
+                <a:cs typeface="Liberation Sans" pitchFamily="34"/>
+              </a:rPr>
+              <a:t>. הוכחנו בשיעור 2</a:t>
+            </a:r>
+            <a:r>
+              <a:rPr lang="he-IL" sz="4000" b="0" i="0" u="none" strike="noStrike" kern="1200" cap="none">
+                <a:ln>
+                  <a:noFill/>
+                </a:ln>
+                <a:latin typeface="Liberation Sans" pitchFamily="34"/>
+                <a:ea typeface="David CLM" pitchFamily="2"/>
+                <a:cs typeface="Liberation Sans" pitchFamily="34"/>
+              </a:rPr>
+              <a:t>. ***</a:t>
+            </a:r>
+            <a:endParaRPr lang="en-US" sz="4000" b="0" i="0" u="none" strike="noStrike" kern="1200" cap="none">
+              <a:ln>
+                <a:noFill/>
+              </a:ln>
+              <a:latin typeface="Liberation Sans" pitchFamily="34"/>
+              <a:ea typeface="David CLM" pitchFamily="2"/>
+              <a:cs typeface="Liberation Sans" pitchFamily="34"/>
+            </a:endParaRPr>
+          </a:p>
+          <a:p>
+            <a:pPr marL="0" marR="0" lvl="0" indent="0" algn="r" rtl="1" hangingPunct="0">
+              <a:lnSpc>
+                <a:spcPct val="100000"/>
+              </a:lnSpc>
+              <a:spcBef>
+                <a:spcPts val="0"/>
+              </a:spcBef>
+              <a:spcAft>
+                <a:spcPts val="0"/>
+              </a:spcAft>
+              <a:buNone/>
+              <a:tabLst/>
+            </a:pPr>
+            <a:endParaRPr lang="en-US" sz="4000" b="0" i="0" u="none" strike="noStrike" kern="1200" cap="none">
+              <a:ln>
+                <a:noFill/>
+              </a:ln>
+              <a:latin typeface="Liberation Sans" pitchFamily="34"/>
+              <a:ea typeface="David CLM" pitchFamily="2"/>
+              <a:cs typeface="Liberation Sans" pitchFamily="34"/>
+            </a:endParaRPr>
+          </a:p>
+          <a:p>
+            <a:pPr marL="0" marR="0" lvl="0" indent="0" algn="r" rtl="1" hangingPunct="0">
+              <a:lnSpc>
+                <a:spcPct val="100000"/>
+              </a:lnSpc>
+              <a:spcBef>
+                <a:spcPts val="0"/>
+              </a:spcBef>
+              <a:spcAft>
+                <a:spcPts val="0"/>
+              </a:spcAft>
+              <a:buNone/>
+              <a:tabLst/>
+            </a:pPr>
+            <a:r>
+              <a:rPr lang="he-IL" sz="4000" b="1" i="0" u="none" strike="noStrike" kern="1200" cap="none">
+                <a:ln>
+                  <a:noFill/>
+                </a:ln>
+                <a:solidFill>
+                  <a:srgbClr val="00CC00"/>
+                </a:solidFill>
+                <a:latin typeface="Liberation Sans" pitchFamily="34"/>
+                <a:ea typeface="David CLM" pitchFamily="2"/>
+                <a:cs typeface="Liberation Sans" pitchFamily="34"/>
+              </a:rPr>
+              <a:t>משפט</a:t>
+            </a:r>
+            <a:r>
+              <a:rPr lang="he-IL" sz="4000" b="0" i="0" u="none" strike="noStrike" kern="1200" cap="none">
+                <a:ln>
+                  <a:noFill/>
+                </a:ln>
+                <a:solidFill>
+                  <a:srgbClr val="00CC00"/>
+                </a:solidFill>
+                <a:latin typeface="Liberation Sans" pitchFamily="34"/>
+                <a:ea typeface="David CLM" pitchFamily="2"/>
+                <a:cs typeface="Liberation Sans" pitchFamily="34"/>
+              </a:rPr>
+              <a:t>. </a:t>
+            </a:r>
+            <a:r>
+              <a:rPr lang="en-US" sz="4000" b="0" i="0" u="none" strike="noStrike" kern="1200" cap="none">
+                <a:ln>
+                  <a:noFill/>
+                </a:ln>
+                <a:solidFill>
+                  <a:srgbClr val="00CC00"/>
+                </a:solidFill>
+                <a:latin typeface="Liberation Sans" pitchFamily="34"/>
+                <a:ea typeface="David CLM" pitchFamily="2"/>
+                <a:cs typeface="Liberation Sans" pitchFamily="34"/>
+              </a:rPr>
+              <a:t>כל תקציב נאש הוא פָרִיק</a:t>
+            </a:r>
+            <a:r>
+              <a:rPr lang="he-IL" sz="4000" b="0" i="0" u="none" strike="noStrike" kern="1200" cap="none">
+                <a:ln>
+                  <a:noFill/>
+                </a:ln>
+                <a:solidFill>
+                  <a:srgbClr val="00CC00"/>
+                </a:solidFill>
+                <a:latin typeface="Liberation Sans" pitchFamily="34"/>
+                <a:ea typeface="David CLM" pitchFamily="2"/>
+                <a:cs typeface="Liberation Sans" pitchFamily="34"/>
+              </a:rPr>
+              <a:t> &gt;</a:t>
+            </a:r>
+            <a:endParaRPr lang="en-US" sz="4000" b="0" i="0" u="none" strike="noStrike" kern="1200" cap="none">
+              <a:ln>
+                <a:noFill/>
+              </a:ln>
+              <a:solidFill>
+                <a:srgbClr val="00CC00"/>
+              </a:solidFill>
+              <a:latin typeface="Liberation Sans" pitchFamily="34"/>
+              <a:ea typeface="David CLM" pitchFamily="2"/>
+              <a:cs typeface="Liberation Sans" pitchFamily="34"/>
+            </a:endParaRPr>
+          </a:p>
+        </p:txBody>
+      </p:sp>
+    </p:spTree>
+  </p:cSld>
+  <p:clrMapOvr>
+    <a:masterClrMapping/>
+  </p:clrMapOvr>
+  <p:timing>
+    <p:tnLst>
+      <p:par>
+        <p:cTn id="1" dur="indefinite" restart="never" nodeType="tmRoot">
+          <p:childTnLst>
+            <p:seq concurrent="1" nextAc="seek">
+              <p:cTn id="2" dur="indefinite" nodeType="mainSeq">
+                <p:childTnLst>
+                  <p:par>
+                    <p:cTn id="3" fill="hold">
+                      <p:stCondLst>
+                        <p:cond delay="indefinite"/>
+                      </p:stCondLst>
+                      <p:childTnLst>
+                        <p:par>
+                          <p:cTn id="4" fill="hold">
+                            <p:stCondLst>
+                              <p:cond delay="0"/>
+                            </p:stCondLst>
+                            <p:childTnLst>
+                              <p:par>
+                                <p:cTn id="5" presetClass="entr" fill="hold" nodeType="clickEffect">
+                                  <p:stCondLst>
+                                    <p:cond delay="0"/>
+                                  </p:stCondLst>
+                                  <p:childTnLst>
+                                    <p:set>
+                                      <p:cBhvr>
+                                        <p:cTn id="6" dur="1" fill="hold">
+                                          <p:stCondLst>
+                                            <p:cond delay="0"/>
+                                          </p:stCondLst>
+                                        </p:cTn>
+                                        <p:tgtEl>
+                                          <p:spTgt spid="4">
+                                            <p:txEl>
+                                              <p:pRg st="2" end="2"/>
+                                            </p:txEl>
+                                          </p:spTgt>
+                                        </p:tgtEl>
+                                        <p:attrNameLst>
+                                          <p:attrName>style.visibility</p:attrName>
+                                        </p:attrNameLst>
+                                      </p:cBhvr>
+                                      <p:to>
+                                        <p:strVal val="visible"/>
+                                      </p:to>
+                                    </p:set>
+                                  </p:childTnLst>
+                                </p:cTn>
+                              </p:par>
+                              <p:par>
+                                <p:cTn id="7" presetClass="entr" fill="hold" nodeType="withEffect">
+                                  <p:stCondLst>
+                                    <p:cond delay="0"/>
+                                  </p:stCondLst>
+                                  <p:childTnLst>
+                                    <p:set>
+                                      <p:cBhvr>
+                                        <p:cTn id="8" dur="1" fill="hold">
+                                          <p:stCondLst>
+                                            <p:cond delay="0"/>
+                                          </p:stCondLst>
+                                        </p:cTn>
+                                        <p:tgtEl>
+                                          <p:spTgt spid="4">
+                                            <p:txEl>
+                                              <p:pRg st="3" end="3"/>
+                                            </p:txEl>
+                                          </p:spTgt>
+                                        </p:tgtEl>
+                                        <p:attrNameLst>
+                                          <p:attrName>style.visibility</p:attrName>
+                                        </p:attrNameLst>
+                                      </p:cBhvr>
+                                      <p:to>
+                                        <p:strVal val="visible"/>
+                                      </p:to>
+                                    </p:set>
+                                  </p:childTnLst>
+                                </p:cTn>
+                              </p:par>
+                            </p:childTnLst>
+                          </p:cTn>
+                        </p:par>
+                      </p:childTnLst>
+                    </p:cTn>
+                  </p:par>
+                  <p:par>
+                    <p:cTn id="9" fill="hold">
+                      <p:stCondLst>
+                        <p:cond delay="indefinite"/>
+                      </p:stCondLst>
+                      <p:childTnLst>
+                        <p:par>
+                          <p:cTn id="10" fill="hold">
+                            <p:stCondLst>
+                              <p:cond delay="0"/>
+                            </p:stCondLst>
+                            <p:childTnLst>
+                              <p:par>
+                                <p:cTn id="11" presetClass="entr" fill="hold" nodeType="clickEffect">
+                                  <p:stCondLst>
+                                    <p:cond delay="0"/>
+                                  </p:stCondLst>
+                                  <p:childTnLst>
+                                    <p:set>
+                                      <p:cBhvr>
+                                        <p:cTn id="12" dur="1" fill="hold">
+                                          <p:stCondLst>
+                                            <p:cond delay="0"/>
+                                          </p:stCondLst>
+                                        </p:cTn>
+                                        <p:tgtEl>
+                                          <p:spTgt spid="4">
+                                            <p:txEl>
+                                              <p:pRg st="4" end="4"/>
+                                            </p:txEl>
+                                          </p:spTgt>
+                                        </p:tgtEl>
+                                        <p:attrNameLst>
+                                          <p:attrName>style.visibility</p:attrName>
+                                        </p:attrNameLst>
+                                      </p:cBhvr>
+                                      <p:to>
+                                        <p:strVal val="visible"/>
+                                      </p:to>
+                                    </p:set>
+                                  </p:childTnLst>
+                                </p:cTn>
+                              </p:par>
+                            </p:childTnLst>
+                          </p:cTn>
+                        </p:par>
+                      </p:childTnLst>
+                    </p:cTn>
+                  </p:par>
+                  <p:par>
+                    <p:cTn id="13" fill="hold">
+                      <p:stCondLst>
+                        <p:cond delay="indefinite"/>
+                      </p:stCondLst>
+                      <p:childTnLst>
+                        <p:par>
+                          <p:cTn id="14" fill="hold">
+                            <p:stCondLst>
+                              <p:cond delay="0"/>
+                            </p:stCondLst>
+                            <p:childTnLst>
+                              <p:par>
+                                <p:cTn id="15" presetClass="entr" fill="hold" nodeType="clickEffect">
+                                  <p:stCondLst>
+                                    <p:cond delay="0"/>
+                                  </p:stCondLst>
+                                  <p:childTnLst>
+                                    <p:set>
+                                      <p:cBhvr>
+                                        <p:cTn id="16" dur="1" fill="hold">
+                                          <p:stCondLst>
+                                            <p:cond delay="0"/>
+                                          </p:stCondLst>
+                                        </p:cTn>
+                                        <p:tgtEl>
+                                          <p:spTgt spid="4">
+                                            <p:txEl>
+                                              <p:pRg st="6" end="6"/>
+                                            </p:txEl>
+                                          </p:spTgt>
+                                        </p:tgtEl>
+                                        <p:attrNameLst>
+                                          <p:attrName>style.visibility</p:attrName>
+                                        </p:attrNameLst>
+                                      </p:cBhvr>
+                                      <p:to>
+                                        <p:strVal val="visible"/>
+                                      </p:to>
+                                    </p:set>
+                                  </p:childTnLst>
+                                </p:cTn>
+                              </p:par>
+                            </p:childTnLst>
+                          </p:cTn>
+                        </p:par>
+                      </p:childTnLst>
+                    </p:cTn>
+                  </p:par>
+                  <p:par>
+                    <p:cTn id="17" fill="hold">
+                      <p:stCondLst>
+                        <p:cond delay="indefinite"/>
+                      </p:stCondLst>
+                      <p:childTnLst>
+                        <p:par>
+                          <p:cTn id="18" fill="hold">
+                            <p:stCondLst>
+                              <p:cond delay="0"/>
+                            </p:stCondLst>
+                            <p:childTnLst>
+                              <p:par>
+                                <p:cTn id="19" presetClass="entr" fill="hold" nodeType="clickEffect">
+                                  <p:stCondLst>
+                                    <p:cond delay="0"/>
+                                  </p:stCondLst>
+                                  <p:childTnLst>
+                                    <p:set>
+                                      <p:cBhvr>
+                                        <p:cTn id="20" dur="1" fill="hold">
+                                          <p:stCondLst>
+                                            <p:cond delay="0"/>
+                                          </p:stCondLst>
+                                        </p:cTn>
+                                        <p:tgtEl>
+                                          <p:spTgt spid="4">
+                                            <p:txEl>
+                                              <p:pRg st="7" end="7"/>
+                                            </p:txEl>
+                                          </p:spTgt>
+                                        </p:tgtEl>
+                                        <p:attrNameLst>
+                                          <p:attrName>style.visibility</p:attrName>
+                                        </p:attrNameLst>
+                                      </p:cBhvr>
+                                      <p:to>
+                                        <p:strVal val="visible"/>
+                                      </p:to>
+                                    </p:set>
+                                  </p:childTnLst>
+                                </p:cTn>
+                              </p:par>
+                            </p:childTnLst>
+                          </p:cTn>
+                        </p:par>
+                      </p:childTnLst>
+                    </p:cTn>
+                  </p:par>
+                  <p:par>
+                    <p:cTn id="21" fill="hold">
+                      <p:stCondLst>
+                        <p:cond delay="indefinite"/>
+                      </p:stCondLst>
+                      <p:childTnLst>
+                        <p:par>
+                          <p:cTn id="22" fill="hold">
+                            <p:stCondLst>
+                              <p:cond delay="0"/>
+                            </p:stCondLst>
+                            <p:childTnLst>
+                              <p:par>
+                                <p:cTn id="23" presetClass="entr" fill="hold" nodeType="clickEffect">
+                                  <p:stCondLst>
+                                    <p:cond delay="0"/>
+                                  </p:stCondLst>
+                                  <p:childTnLst>
+                                    <p:set>
+                                      <p:cBhvr>
+                                        <p:cTn id="24" dur="1" fill="hold">
+                                          <p:stCondLst>
+                                            <p:cond delay="0"/>
+                                          </p:stCondLst>
+                                        </p:cTn>
+                                        <p:tgtEl>
+                                          <p:spTgt spid="4">
+                                            <p:txEl>
+                                              <p:pRg st="9" end="9"/>
+                                            </p:txEl>
+                                          </p:spTgt>
+                                        </p:tgtEl>
+                                        <p:attrNameLst>
+                                          <p:attrName>style.visibility</p:attrName>
+                                        </p:attrNameLst>
+                                      </p:cBhvr>
+                                      <p:to>
+                                        <p:strVal val="visible"/>
+                                      </p:to>
+                                    </p:set>
+                                  </p:childTnLst>
+                                </p:cTn>
+                              </p:par>
+                            </p:childTnLst>
+                          </p:cTn>
+                        </p:par>
+                      </p:childTnLst>
+                    </p:cTn>
+                  </p:par>
+                </p:childTnLst>
+              </p:cTn>
+              <p:prevCondLst>
+                <p:cond evt="onPrev" delay="0">
+                  <p:tgtEl>
+                    <p:sldTgt/>
+                  </p:tgtEl>
+                </p:cond>
+              </p:prevCondLst>
+              <p:nextCondLst>
+                <p:cond evt="onNext" delay="0">
+                  <p:tgtEl>
+                    <p:sldTgt/>
+                  </p:tgtEl>
+                </p:cond>
+              </p:nextCondLst>
+            </p:seq>
+          </p:childTnLst>
+        </p:cTn>
+      </p:par>
+    </p:tnLst>
+  </p:timing>
+</p:sld>
+</file>
+
+<file path=ppt/slides/slide11.xml><?xml version="1.0" encoding="utf-8"?>
+<p:sld xmlns:a="http://schemas.openxmlformats.org/drawingml/2006/main" xmlns:r="http://schemas.openxmlformats.org/officeDocument/2006/relationships" xmlns:p="http://schemas.openxmlformats.org/presentationml/2006/main">
+  <p:cSld name="page10">
+    <p:spTree>
+      <p:nvGrpSpPr>
+        <p:cNvPr id="1" name=""/>
+        <p:cNvGrpSpPr/>
+        <p:nvPr/>
+      </p:nvGrpSpPr>
+      <p:grpSpPr>
+        <a:xfrm>
+          <a:off x="0" y="0"/>
+          <a:ext cx="0" cy="0"/>
+          <a:chOff x="0" y="0"/>
+          <a:chExt cx="0" cy="0"/>
+        </a:xfrm>
+      </p:grpSpPr>
+      <p:sp>
+        <p:nvSpPr>
+          <p:cNvPr id="2" name="Title 1_8">
+            <a:extLst>
+              <a:ext uri="{FF2B5EF4-FFF2-40B4-BE49-F238E27FC236}">
+                <a16:creationId xmlns:a16="http://schemas.microsoft.com/office/drawing/2014/main" id="{1664740B-9466-E37C-9903-9D33B67A8713}"/>
+              </a:ext>
+            </a:extLst>
+          </p:cNvPr>
+          <p:cNvSpPr txBox="1">
+            <a:spLocks noGrp="1"/>
+          </p:cNvSpPr>
+          <p:nvPr>
+            <p:ph type="title" idx="4294967295"/>
+          </p:nvPr>
+        </p:nvSpPr>
+        <p:spPr>
+          <a:xfrm>
+            <a:off x="0" y="-272160"/>
+            <a:ext cx="10080720" cy="1460880"/>
+          </a:xfrm>
+        </p:spPr>
+        <p:txBody>
+          <a:bodyPr vert="horz" wrap="square" lIns="91440" tIns="45720" rIns="91440" bIns="45720">
+            <a:noAutofit/>
+          </a:bodyPr>
+          <a:lstStyle/>
+          <a:p>
+            <a:pPr lvl="0" rtl="1" hangingPunct="1">
+              <a:lnSpc>
+                <a:spcPct val="90000"/>
+              </a:lnSpc>
+            </a:pPr>
+            <a:r>
+              <a:rPr lang="he-IL" sz="5400">
+                <a:solidFill>
+                  <a:srgbClr val="000000"/>
+                </a:solidFill>
+                <a:latin typeface="Liberation Sans" pitchFamily="34"/>
+                <a:cs typeface="Liberation Sans" pitchFamily="34"/>
+              </a:rPr>
+              <a:t>תקציב נאש - פריקוּת</a:t>
+            </a:r>
+          </a:p>
+        </p:txBody>
+      </p:sp>
+      <p:sp>
+        <p:nvSpPr>
+          <p:cNvPr id="3" name="Content Placeholder 2_7">
+            <a:extLst>
+              <a:ext uri="{FF2B5EF4-FFF2-40B4-BE49-F238E27FC236}">
+                <a16:creationId xmlns:a16="http://schemas.microsoft.com/office/drawing/2014/main" id="{803C5344-CF19-A755-9B28-E035C3034F62}"/>
+              </a:ext>
+            </a:extLst>
+          </p:cNvPr>
+          <p:cNvSpPr txBox="1"/>
+          <p:nvPr/>
+        </p:nvSpPr>
+        <p:spPr>
+          <a:xfrm>
+            <a:off x="457200" y="1188719"/>
+            <a:ext cx="8694360" cy="4796280"/>
+          </a:xfrm>
+          <a:prstGeom prst="rect">
+            <a:avLst/>
+          </a:prstGeom>
+          <a:noFill/>
+          <a:ln>
+            <a:noFill/>
+          </a:ln>
+        </p:spPr>
+        <p:txBody>
+          <a:bodyPr vert="horz" wrap="square" lIns="91440" tIns="45720" rIns="91440" bIns="45720" anchor="t" compatLnSpc="0">
+            <a:noAutofit/>
+          </a:bodyPr>
+          <a:lstStyle/>
+          <a:p>
+            <a:pPr marL="0" marR="0" lvl="0" indent="0" algn="l" rtl="0" hangingPunct="0">
+              <a:spcBef>
+                <a:spcPts val="2750"/>
+              </a:spcBef>
+              <a:spcAft>
+                <a:spcPts val="0"/>
+              </a:spcAft>
+              <a:buNone/>
+              <a:tabLst/>
+            </a:pPr>
+            <a:endParaRPr lang="en-US" sz="3000" b="0" i="0" u="none" strike="noStrike" kern="1200" spc="0">
+              <a:ln>
+                <a:noFill/>
+              </a:ln>
+              <a:solidFill>
+                <a:srgbClr val="000000"/>
+              </a:solidFill>
+              <a:latin typeface="ＭＳ Ｐゴシック" pitchFamily="18"/>
+              <a:ea typeface="Liberation Sans" pitchFamily="34"/>
+              <a:cs typeface="DejaVu Sans" pitchFamily="2"/>
+            </a:endParaRPr>
+          </a:p>
+        </p:txBody>
+      </p:sp>
+      <p:sp>
+        <p:nvSpPr>
+          <p:cNvPr id="4" name="TextBox 3">
+            <a:extLst>
+              <a:ext uri="{FF2B5EF4-FFF2-40B4-BE49-F238E27FC236}">
                 <a16:creationId xmlns:a16="http://schemas.microsoft.com/office/drawing/2014/main" id="{B79D88E9-507B-20E5-FCBD-EC6CF0F93BDF}"/>
               </a:ext>
             </a:extLst>
@@ -19004,7 +20160,7 @@
 </p:sld>
 </file>
 
-<file path=ppt/slides/slide11.xml><?xml version="1.0" encoding="utf-8"?>
+<file path=ppt/slides/slide12.xml><?xml version="1.0" encoding="utf-8"?>
 <p:sld xmlns:a="http://schemas.openxmlformats.org/drawingml/2006/main" xmlns:r="http://schemas.openxmlformats.org/officeDocument/2006/relationships" xmlns:p="http://schemas.openxmlformats.org/presentationml/2006/main">
   <p:cSld name="page11">
     <p:spTree>
@@ -19984,7 +21140,7 @@
 </p:sld>
 </file>
 
-<file path=ppt/slides/slide12.xml><?xml version="1.0" encoding="utf-8"?>
+<file path=ppt/slides/slide13.xml><?xml version="1.0" encoding="utf-8"?>
 <p:sld xmlns:a="http://schemas.openxmlformats.org/drawingml/2006/main" xmlns:r="http://schemas.openxmlformats.org/officeDocument/2006/relationships" xmlns:p="http://schemas.openxmlformats.org/presentationml/2006/main">
   <p:cSld name="page12">
     <p:spTree>
@@ -21196,7 +22352,7 @@
 </p:sld>
 </file>
 
-<file path=ppt/slides/slide13.xml><?xml version="1.0" encoding="utf-8"?>
+<file path=ppt/slides/slide14.xml><?xml version="1.0" encoding="utf-8"?>
 <p:sld xmlns:a="http://schemas.openxmlformats.org/drawingml/2006/main" xmlns:r="http://schemas.openxmlformats.org/officeDocument/2006/relationships" xmlns:p="http://schemas.openxmlformats.org/presentationml/2006/main">
   <p:cSld name="page13">
     <p:spTree>
@@ -22075,7 +23231,7 @@
 </p:sld>
 </file>
 
-<file path=ppt/slides/slide14.xml><?xml version="1.0" encoding="utf-8"?>
+<file path=ppt/slides/slide15.xml><?xml version="1.0" encoding="utf-8"?>
 <p:sld xmlns:a="http://schemas.openxmlformats.org/drawingml/2006/main" xmlns:r="http://schemas.openxmlformats.org/officeDocument/2006/relationships" xmlns:p="http://schemas.openxmlformats.org/presentationml/2006/main">
   <p:cSld name="page14">
     <p:spTree>
@@ -23461,7 +24617,7 @@
 </p:sld>
 </file>
 
-<file path=ppt/slides/slide15.xml><?xml version="1.0" encoding="utf-8"?>
+<file path=ppt/slides/slide16.xml><?xml version="1.0" encoding="utf-8"?>
 <p:sld xmlns:a="http://schemas.openxmlformats.org/drawingml/2006/main" xmlns:r="http://schemas.openxmlformats.org/officeDocument/2006/relationships" xmlns:p="http://schemas.openxmlformats.org/presentationml/2006/main">
   <p:cSld name="page15">
     <p:spTree>
@@ -24440,7 +25596,7 @@
 </p:sld>
 </file>
 
-<file path=ppt/slides/slide16.xml><?xml version="1.0" encoding="utf-8"?>
+<file path=ppt/slides/slide17.xml><?xml version="1.0" encoding="utf-8"?>
 <p:sld xmlns:a="http://schemas.openxmlformats.org/drawingml/2006/main" xmlns:r="http://schemas.openxmlformats.org/officeDocument/2006/relationships" xmlns:p="http://schemas.openxmlformats.org/presentationml/2006/main">
   <p:cSld name="page16">
     <p:spTree>
@@ -25690,7 +26846,7 @@
 </p:sld>
 </file>
 
-<file path=ppt/slides/slide17.xml><?xml version="1.0" encoding="utf-8"?>
+<file path=ppt/slides/slide18.xml><?xml version="1.0" encoding="utf-8"?>
 <p:sld xmlns:a="http://schemas.openxmlformats.org/drawingml/2006/main" xmlns:r="http://schemas.openxmlformats.org/officeDocument/2006/relationships" xmlns:p="http://schemas.openxmlformats.org/presentationml/2006/main">
   <p:cSld name="page17">
     <p:spTree>
@@ -32197,6 +33353,890 @@
 
 <file path=ppt/slides/slide8.xml><?xml version="1.0" encoding="utf-8"?>
 <p:sld xmlns:a="http://schemas.openxmlformats.org/drawingml/2006/main" xmlns:r="http://schemas.openxmlformats.org/officeDocument/2006/relationships" xmlns:p="http://schemas.openxmlformats.org/presentationml/2006/main">
+  <p:cSld>
+    <p:spTree>
+      <p:nvGrpSpPr>
+        <p:cNvPr id="1" name="">
+          <a:extLst>
+            <a:ext uri="{FF2B5EF4-FFF2-40B4-BE49-F238E27FC236}">
+              <a16:creationId xmlns:a16="http://schemas.microsoft.com/office/drawing/2014/main" id="{8676BA9E-C7A4-497E-97CA-16CDD361020E}"/>
+            </a:ext>
+          </a:extLst>
+        </p:cNvPr>
+        <p:cNvGrpSpPr/>
+        <p:nvPr/>
+      </p:nvGrpSpPr>
+      <p:grpSpPr>
+        <a:xfrm>
+          <a:off x="0" y="0"/>
+          <a:ext cx="0" cy="0"/>
+          <a:chOff x="0" y="0"/>
+          <a:chExt cx="0" cy="0"/>
+        </a:xfrm>
+      </p:grpSpPr>
+      <p:sp>
+        <p:nvSpPr>
+          <p:cNvPr id="2" name="Title 1_3">
+            <a:extLst>
+              <a:ext uri="{FF2B5EF4-FFF2-40B4-BE49-F238E27FC236}">
+                <a16:creationId xmlns:a16="http://schemas.microsoft.com/office/drawing/2014/main" id="{7DE53CA6-1DF3-DCE7-81E9-77FD1722959B}"/>
+              </a:ext>
+            </a:extLst>
+          </p:cNvPr>
+          <p:cNvSpPr txBox="1">
+            <a:spLocks noGrp="1"/>
+          </p:cNvSpPr>
+          <p:nvPr>
+            <p:ph type="title" idx="4294967295"/>
+          </p:nvPr>
+        </p:nvSpPr>
+        <p:spPr>
+          <a:xfrm>
+            <a:off x="274320" y="-91440"/>
+            <a:ext cx="9601200" cy="1460880"/>
+          </a:xfrm>
+        </p:spPr>
+        <p:txBody>
+          <a:bodyPr vert="horz" wrap="square" lIns="91440" tIns="45720" rIns="91440" bIns="45720">
+            <a:noAutofit/>
+          </a:bodyPr>
+          <a:lstStyle/>
+          <a:p>
+            <a:pPr lvl="0" rtl="1" hangingPunct="1">
+              <a:lnSpc>
+                <a:spcPct val="90000"/>
+              </a:lnSpc>
+            </a:pPr>
+            <a:r>
+              <a:rPr lang="he-IL" sz="5400">
+                <a:solidFill>
+                  <a:srgbClr val="000000"/>
+                </a:solidFill>
+                <a:latin typeface="Liberation Sans" pitchFamily="34"/>
+                <a:cs typeface="Liberation Sans" pitchFamily="34"/>
+              </a:rPr>
+              <a:t>תקציב פריק – תרשים</a:t>
+            </a:r>
+          </a:p>
+        </p:txBody>
+      </p:sp>
+      <p:graphicFrame>
+        <p:nvGraphicFramePr>
+          <p:cNvPr id="5" name="Table 4">
+            <a:extLst>
+              <a:ext uri="{FF2B5EF4-FFF2-40B4-BE49-F238E27FC236}">
+                <a16:creationId xmlns:a16="http://schemas.microsoft.com/office/drawing/2014/main" id="{6B89A22F-5DFD-4D03-D0A4-C9DECC1DF262}"/>
+              </a:ext>
+            </a:extLst>
+          </p:cNvPr>
+          <p:cNvGraphicFramePr>
+            <a:graphicFrameLocks noGrp="1"/>
+          </p:cNvGraphicFramePr>
+          <p:nvPr>
+            <p:extLst>
+              <p:ext uri="{D42A27DB-BD31-4B8C-83A1-F6EECF244321}">
+                <p14:modId xmlns:p14="http://schemas.microsoft.com/office/powerpoint/2010/main" val="813402922"/>
+              </p:ext>
+            </p:extLst>
+          </p:nvPr>
+        </p:nvGraphicFramePr>
+        <p:xfrm>
+          <a:off x="1150636" y="1793697"/>
+          <a:ext cx="7249886" cy="3010692"/>
+        </p:xfrm>
+        <a:graphic>
+          <a:graphicData uri="http://schemas.openxmlformats.org/drawingml/2006/table">
+            <a:tbl>
+              <a:tblPr rtl="1" firstRow="1" bandRow="1">
+                <a:tableStyleId>{775DCB02-9BB8-47FD-8907-85C794F793BA}</a:tableStyleId>
+              </a:tblPr>
+              <a:tblGrid>
+                <a:gridCol w="1069091">
+                  <a:extLst>
+                    <a:ext uri="{9D8B030D-6E8A-4147-A177-3AD203B41FA5}">
+                      <a16:colId xmlns:a16="http://schemas.microsoft.com/office/drawing/2014/main" val="136294870"/>
+                    </a:ext>
+                  </a:extLst>
+                </a:gridCol>
+                <a:gridCol w="1236159">
+                  <a:extLst>
+                    <a:ext uri="{9D8B030D-6E8A-4147-A177-3AD203B41FA5}">
+                      <a16:colId xmlns:a16="http://schemas.microsoft.com/office/drawing/2014/main" val="1045253322"/>
+                    </a:ext>
+                  </a:extLst>
+                </a:gridCol>
+                <a:gridCol w="1236159">
+                  <a:extLst>
+                    <a:ext uri="{9D8B030D-6E8A-4147-A177-3AD203B41FA5}">
+                      <a16:colId xmlns:a16="http://schemas.microsoft.com/office/drawing/2014/main" val="518626333"/>
+                    </a:ext>
+                  </a:extLst>
+                </a:gridCol>
+                <a:gridCol w="1236159">
+                  <a:extLst>
+                    <a:ext uri="{9D8B030D-6E8A-4147-A177-3AD203B41FA5}">
+                      <a16:colId xmlns:a16="http://schemas.microsoft.com/office/drawing/2014/main" val="1616729752"/>
+                    </a:ext>
+                  </a:extLst>
+                </a:gridCol>
+                <a:gridCol w="1236159">
+                  <a:extLst>
+                    <a:ext uri="{9D8B030D-6E8A-4147-A177-3AD203B41FA5}">
+                      <a16:colId xmlns:a16="http://schemas.microsoft.com/office/drawing/2014/main" val="2401212738"/>
+                    </a:ext>
+                  </a:extLst>
+                </a:gridCol>
+                <a:gridCol w="1236159">
+                  <a:extLst>
+                    <a:ext uri="{9D8B030D-6E8A-4147-A177-3AD203B41FA5}">
+                      <a16:colId xmlns:a16="http://schemas.microsoft.com/office/drawing/2014/main" val="335756025"/>
+                    </a:ext>
+                  </a:extLst>
+                </a:gridCol>
+              </a:tblGrid>
+              <a:tr h="566948">
+                <a:tc>
+                  <a:txBody>
+                    <a:bodyPr/>
+                    <a:lstStyle/>
+                    <a:p>
+                      <a:pPr algn="ctr" rtl="1"/>
+                      <a:endParaRPr lang="he-IL"/>
+                    </a:p>
+                  </a:txBody>
+                  <a:tcPr/>
+                </a:tc>
+                <a:tc>
+                  <a:txBody>
+                    <a:bodyPr/>
+                    <a:lstStyle/>
+                    <a:p>
+                      <a:pPr algn="ctr" rtl="1"/>
+                      <a:r>
+                        <a:rPr lang="he-IL"/>
+                        <a:t>נושא 1</a:t>
+                      </a:r>
+                    </a:p>
+                  </a:txBody>
+                  <a:tcPr/>
+                </a:tc>
+                <a:tc>
+                  <a:txBody>
+                    <a:bodyPr/>
+                    <a:lstStyle/>
+                    <a:p>
+                      <a:pPr algn="ctr" rtl="1"/>
+                      <a:r>
+                        <a:rPr lang="he-IL"/>
+                        <a:t>נושא 2</a:t>
+                      </a:r>
+                    </a:p>
+                  </a:txBody>
+                  <a:tcPr/>
+                </a:tc>
+                <a:tc>
+                  <a:txBody>
+                    <a:bodyPr/>
+                    <a:lstStyle/>
+                    <a:p>
+                      <a:pPr algn="ctr" rtl="1"/>
+                      <a:r>
+                        <a:rPr lang="he-IL"/>
+                        <a:t>נושא 3</a:t>
+                      </a:r>
+                    </a:p>
+                  </a:txBody>
+                  <a:tcPr/>
+                </a:tc>
+                <a:tc>
+                  <a:txBody>
+                    <a:bodyPr/>
+                    <a:lstStyle/>
+                    <a:p>
+                      <a:pPr algn="ctr" rtl="1"/>
+                      <a:r>
+                        <a:rPr lang="he-IL"/>
+                        <a:t>נושא 4</a:t>
+                      </a:r>
+                    </a:p>
+                  </a:txBody>
+                  <a:tcPr/>
+                </a:tc>
+                <a:tc>
+                  <a:txBody>
+                    <a:bodyPr/>
+                    <a:lstStyle/>
+                    <a:p>
+                      <a:pPr algn="ctr" rtl="1"/>
+                      <a:r>
+                        <a:rPr lang="he-IL"/>
+                        <a:t>סה"כ</a:t>
+                      </a:r>
+                    </a:p>
+                  </a:txBody>
+                  <a:tcPr/>
+                </a:tc>
+                <a:extLst>
+                  <a:ext uri="{0D108BD9-81ED-4DB2-BD59-A6C34878D82A}">
+                    <a16:rowId xmlns:a16="http://schemas.microsoft.com/office/drawing/2014/main" val="3567215413"/>
+                  </a:ext>
+                </a:extLst>
+              </a:tr>
+              <a:tr h="523504">
+                <a:tc>
+                  <a:txBody>
+                    <a:bodyPr/>
+                    <a:lstStyle/>
+                    <a:p>
+                      <a:pPr algn="ctr" rtl="1"/>
+                      <a:r>
+                        <a:rPr lang="he-IL"/>
+                        <a:t>אזרח 1:</a:t>
+                      </a:r>
+                    </a:p>
+                  </a:txBody>
+                  <a:tcPr/>
+                </a:tc>
+                <a:tc>
+                  <a:txBody>
+                    <a:bodyPr/>
+                    <a:lstStyle/>
+                    <a:p>
+                      <a:pPr algn="ctr" rtl="1"/>
+                      <a:r>
+                        <a:rPr lang="en-US"/>
+                        <a:t>d</a:t>
+                      </a:r>
+                      <a:r>
+                        <a:rPr lang="en-US" baseline="-25000"/>
+                        <a:t>1,1</a:t>
+                      </a:r>
+                      <a:endParaRPr lang="he-IL"/>
+                    </a:p>
+                  </a:txBody>
+                  <a:tcPr/>
+                </a:tc>
+                <a:tc>
+                  <a:txBody>
+                    <a:bodyPr/>
+                    <a:lstStyle/>
+                    <a:p>
+                      <a:pPr marL="0" marR="0" lvl="0" indent="0" algn="ctr" defTabSz="914400" rtl="1" eaLnBrk="1" fontAlgn="auto" latinLnBrk="0" hangingPunct="1">
+                        <a:lnSpc>
+                          <a:spcPct val="100000"/>
+                        </a:lnSpc>
+                        <a:spcBef>
+                          <a:spcPts val="0"/>
+                        </a:spcBef>
+                        <a:spcAft>
+                          <a:spcPts val="0"/>
+                        </a:spcAft>
+                        <a:buClrTx/>
+                        <a:buSzTx/>
+                        <a:buFontTx/>
+                        <a:buNone/>
+                        <a:tabLst/>
+                        <a:defRPr/>
+                      </a:pPr>
+                      <a:r>
+                        <a:rPr lang="en-US"/>
+                        <a:t>d</a:t>
+                      </a:r>
+                      <a:r>
+                        <a:rPr lang="en-US" baseline="-25000"/>
+                        <a:t>1,2</a:t>
+                      </a:r>
+                      <a:endParaRPr lang="he-IL"/>
+                    </a:p>
+                  </a:txBody>
+                  <a:tcPr/>
+                </a:tc>
+                <a:tc>
+                  <a:txBody>
+                    <a:bodyPr/>
+                    <a:lstStyle/>
+                    <a:p>
+                      <a:pPr algn="ctr" rtl="1"/>
+                      <a:r>
+                        <a:rPr lang="en-US"/>
+                        <a:t>…</a:t>
+                      </a:r>
+                      <a:endParaRPr lang="he-IL"/>
+                    </a:p>
+                  </a:txBody>
+                  <a:tcPr/>
+                </a:tc>
+                <a:tc>
+                  <a:txBody>
+                    <a:bodyPr/>
+                    <a:lstStyle/>
+                    <a:p>
+                      <a:pPr marL="0" marR="0" lvl="0" indent="0" algn="ctr" defTabSz="914400" rtl="1" eaLnBrk="1" fontAlgn="auto" latinLnBrk="0" hangingPunct="1">
+                        <a:lnSpc>
+                          <a:spcPct val="100000"/>
+                        </a:lnSpc>
+                        <a:spcBef>
+                          <a:spcPts val="0"/>
+                        </a:spcBef>
+                        <a:spcAft>
+                          <a:spcPts val="0"/>
+                        </a:spcAft>
+                        <a:buClrTx/>
+                        <a:buSzTx/>
+                        <a:buFontTx/>
+                        <a:buNone/>
+                        <a:tabLst/>
+                        <a:defRPr/>
+                      </a:pPr>
+                      <a:r>
+                        <a:rPr lang="en-US"/>
+                        <a:t>…</a:t>
+                      </a:r>
+                      <a:endParaRPr lang="he-IL"/>
+                    </a:p>
+                    <a:p>
+                      <a:pPr algn="ctr" rtl="1"/>
+                      <a:endParaRPr lang="he-IL"/>
+                    </a:p>
+                  </a:txBody>
+                  <a:tcPr/>
+                </a:tc>
+                <a:tc>
+                  <a:txBody>
+                    <a:bodyPr/>
+                    <a:lstStyle/>
+                    <a:p>
+                      <a:pPr algn="ctr" rtl="1"/>
+                      <a:r>
+                        <a:rPr lang="en-US"/>
+                        <a:t>C/n</a:t>
+                      </a:r>
+                      <a:endParaRPr lang="he-IL"/>
+                    </a:p>
+                  </a:txBody>
+                  <a:tcPr/>
+                </a:tc>
+                <a:extLst>
+                  <a:ext uri="{0D108BD9-81ED-4DB2-BD59-A6C34878D82A}">
+                    <a16:rowId xmlns:a16="http://schemas.microsoft.com/office/drawing/2014/main" val="4278281707"/>
+                  </a:ext>
+                </a:extLst>
+              </a:tr>
+              <a:tr h="523504">
+                <a:tc>
+                  <a:txBody>
+                    <a:bodyPr/>
+                    <a:lstStyle/>
+                    <a:p>
+                      <a:pPr algn="ctr" rtl="1"/>
+                      <a:r>
+                        <a:rPr lang="he-IL"/>
+                        <a:t>אזרח 2:</a:t>
+                      </a:r>
+                    </a:p>
+                  </a:txBody>
+                  <a:tcPr/>
+                </a:tc>
+                <a:tc>
+                  <a:txBody>
+                    <a:bodyPr/>
+                    <a:lstStyle/>
+                    <a:p>
+                      <a:pPr marL="0" marR="0" lvl="0" indent="0" algn="ctr" defTabSz="914400" rtl="1" eaLnBrk="1" fontAlgn="auto" latinLnBrk="0" hangingPunct="1">
+                        <a:lnSpc>
+                          <a:spcPct val="100000"/>
+                        </a:lnSpc>
+                        <a:spcBef>
+                          <a:spcPts val="0"/>
+                        </a:spcBef>
+                        <a:spcAft>
+                          <a:spcPts val="0"/>
+                        </a:spcAft>
+                        <a:buClrTx/>
+                        <a:buSzTx/>
+                        <a:buFontTx/>
+                        <a:buNone/>
+                        <a:tabLst/>
+                        <a:defRPr/>
+                      </a:pPr>
+                      <a:r>
+                        <a:rPr lang="en-US"/>
+                        <a:t>d</a:t>
+                      </a:r>
+                      <a:r>
+                        <a:rPr lang="en-US" baseline="-25000"/>
+                        <a:t>2,1</a:t>
+                      </a:r>
+                      <a:endParaRPr lang="he-IL"/>
+                    </a:p>
+                  </a:txBody>
+                  <a:tcPr/>
+                </a:tc>
+                <a:tc>
+                  <a:txBody>
+                    <a:bodyPr/>
+                    <a:lstStyle/>
+                    <a:p>
+                      <a:pPr marL="0" marR="0" lvl="0" indent="0" algn="ctr" defTabSz="914400" rtl="1" eaLnBrk="1" fontAlgn="auto" latinLnBrk="0" hangingPunct="1">
+                        <a:lnSpc>
+                          <a:spcPct val="100000"/>
+                        </a:lnSpc>
+                        <a:spcBef>
+                          <a:spcPts val="0"/>
+                        </a:spcBef>
+                        <a:spcAft>
+                          <a:spcPts val="0"/>
+                        </a:spcAft>
+                        <a:buClrTx/>
+                        <a:buSzTx/>
+                        <a:buFontTx/>
+                        <a:buNone/>
+                        <a:tabLst/>
+                        <a:defRPr/>
+                      </a:pPr>
+                      <a:r>
+                        <a:rPr lang="en-US"/>
+                        <a:t>…</a:t>
+                      </a:r>
+                      <a:endParaRPr lang="he-IL"/>
+                    </a:p>
+                    <a:p>
+                      <a:pPr algn="ctr" rtl="1"/>
+                      <a:endParaRPr lang="he-IL"/>
+                    </a:p>
+                  </a:txBody>
+                  <a:tcPr/>
+                </a:tc>
+                <a:tc>
+                  <a:txBody>
+                    <a:bodyPr/>
+                    <a:lstStyle/>
+                    <a:p>
+                      <a:pPr marL="0" marR="0" lvl="0" indent="0" algn="ctr" defTabSz="914400" rtl="1" eaLnBrk="1" fontAlgn="auto" latinLnBrk="0" hangingPunct="1">
+                        <a:lnSpc>
+                          <a:spcPct val="100000"/>
+                        </a:lnSpc>
+                        <a:spcBef>
+                          <a:spcPts val="0"/>
+                        </a:spcBef>
+                        <a:spcAft>
+                          <a:spcPts val="0"/>
+                        </a:spcAft>
+                        <a:buClrTx/>
+                        <a:buSzTx/>
+                        <a:buFontTx/>
+                        <a:buNone/>
+                        <a:tabLst/>
+                        <a:defRPr/>
+                      </a:pPr>
+                      <a:r>
+                        <a:rPr lang="en-US"/>
+                        <a:t>…</a:t>
+                      </a:r>
+                      <a:endParaRPr lang="he-IL"/>
+                    </a:p>
+                    <a:p>
+                      <a:pPr algn="ctr" rtl="1"/>
+                      <a:endParaRPr lang="he-IL"/>
+                    </a:p>
+                  </a:txBody>
+                  <a:tcPr/>
+                </a:tc>
+                <a:tc>
+                  <a:txBody>
+                    <a:bodyPr/>
+                    <a:lstStyle/>
+                    <a:p>
+                      <a:pPr marL="0" marR="0" lvl="0" indent="0" algn="ctr" defTabSz="914400" rtl="1" eaLnBrk="1" fontAlgn="auto" latinLnBrk="0" hangingPunct="1">
+                        <a:lnSpc>
+                          <a:spcPct val="100000"/>
+                        </a:lnSpc>
+                        <a:spcBef>
+                          <a:spcPts val="0"/>
+                        </a:spcBef>
+                        <a:spcAft>
+                          <a:spcPts val="0"/>
+                        </a:spcAft>
+                        <a:buClrTx/>
+                        <a:buSzTx/>
+                        <a:buFontTx/>
+                        <a:buNone/>
+                        <a:tabLst/>
+                        <a:defRPr/>
+                      </a:pPr>
+                      <a:r>
+                        <a:rPr lang="en-US"/>
+                        <a:t>…</a:t>
+                      </a:r>
+                      <a:endParaRPr lang="he-IL"/>
+                    </a:p>
+                    <a:p>
+                      <a:pPr algn="ctr" rtl="1"/>
+                      <a:endParaRPr lang="he-IL"/>
+                    </a:p>
+                  </a:txBody>
+                  <a:tcPr/>
+                </a:tc>
+                <a:tc>
+                  <a:txBody>
+                    <a:bodyPr/>
+                    <a:lstStyle/>
+                    <a:p>
+                      <a:pPr marL="0" marR="0" lvl="0" indent="0" algn="ctr" defTabSz="914400" rtl="1" eaLnBrk="1" fontAlgn="auto" latinLnBrk="0" hangingPunct="1">
+                        <a:lnSpc>
+                          <a:spcPct val="100000"/>
+                        </a:lnSpc>
+                        <a:spcBef>
+                          <a:spcPts val="0"/>
+                        </a:spcBef>
+                        <a:spcAft>
+                          <a:spcPts val="0"/>
+                        </a:spcAft>
+                        <a:buClrTx/>
+                        <a:buSzTx/>
+                        <a:buFontTx/>
+                        <a:buNone/>
+                        <a:tabLst/>
+                        <a:defRPr/>
+                      </a:pPr>
+                      <a:r>
+                        <a:rPr lang="en-US"/>
+                        <a:t>C/n</a:t>
+                      </a:r>
+                      <a:endParaRPr lang="he-IL"/>
+                    </a:p>
+                  </a:txBody>
+                  <a:tcPr/>
+                </a:tc>
+                <a:extLst>
+                  <a:ext uri="{0D108BD9-81ED-4DB2-BD59-A6C34878D82A}">
+                    <a16:rowId xmlns:a16="http://schemas.microsoft.com/office/drawing/2014/main" val="1134833218"/>
+                  </a:ext>
+                </a:extLst>
+              </a:tr>
+              <a:tr h="523504">
+                <a:tc>
+                  <a:txBody>
+                    <a:bodyPr/>
+                    <a:lstStyle/>
+                    <a:p>
+                      <a:pPr algn="ctr" rtl="1"/>
+                      <a:r>
+                        <a:rPr lang="he-IL"/>
+                        <a:t>אזרח 3:</a:t>
+                      </a:r>
+                    </a:p>
+                  </a:txBody>
+                  <a:tcPr/>
+                </a:tc>
+                <a:tc>
+                  <a:txBody>
+                    <a:bodyPr/>
+                    <a:lstStyle/>
+                    <a:p>
+                      <a:pPr marL="0" marR="0" lvl="0" indent="0" algn="ctr" defTabSz="914400" rtl="1" eaLnBrk="1" fontAlgn="auto" latinLnBrk="0" hangingPunct="1">
+                        <a:lnSpc>
+                          <a:spcPct val="100000"/>
+                        </a:lnSpc>
+                        <a:spcBef>
+                          <a:spcPts val="0"/>
+                        </a:spcBef>
+                        <a:spcAft>
+                          <a:spcPts val="0"/>
+                        </a:spcAft>
+                        <a:buClrTx/>
+                        <a:buSzTx/>
+                        <a:buFontTx/>
+                        <a:buNone/>
+                        <a:tabLst/>
+                        <a:defRPr/>
+                      </a:pPr>
+                      <a:r>
+                        <a:rPr lang="en-US"/>
+                        <a:t>…</a:t>
+                      </a:r>
+                      <a:endParaRPr lang="he-IL"/>
+                    </a:p>
+                    <a:p>
+                      <a:pPr algn="ctr" rtl="1"/>
+                      <a:endParaRPr lang="he-IL"/>
+                    </a:p>
+                  </a:txBody>
+                  <a:tcPr/>
+                </a:tc>
+                <a:tc>
+                  <a:txBody>
+                    <a:bodyPr/>
+                    <a:lstStyle/>
+                    <a:p>
+                      <a:pPr marL="0" marR="0" lvl="0" indent="0" algn="ctr" defTabSz="914400" rtl="1" eaLnBrk="1" fontAlgn="auto" latinLnBrk="0" hangingPunct="1">
+                        <a:lnSpc>
+                          <a:spcPct val="100000"/>
+                        </a:lnSpc>
+                        <a:spcBef>
+                          <a:spcPts val="0"/>
+                        </a:spcBef>
+                        <a:spcAft>
+                          <a:spcPts val="0"/>
+                        </a:spcAft>
+                        <a:buClrTx/>
+                        <a:buSzTx/>
+                        <a:buFontTx/>
+                        <a:buNone/>
+                        <a:tabLst/>
+                        <a:defRPr/>
+                      </a:pPr>
+                      <a:r>
+                        <a:rPr lang="en-US"/>
+                        <a:t>…</a:t>
+                      </a:r>
+                      <a:endParaRPr lang="he-IL"/>
+                    </a:p>
+                    <a:p>
+                      <a:pPr algn="ctr" rtl="1"/>
+                      <a:endParaRPr lang="he-IL"/>
+                    </a:p>
+                  </a:txBody>
+                  <a:tcPr/>
+                </a:tc>
+                <a:tc>
+                  <a:txBody>
+                    <a:bodyPr/>
+                    <a:lstStyle/>
+                    <a:p>
+                      <a:pPr marL="0" marR="0" lvl="0" indent="0" algn="ctr" defTabSz="914400" rtl="1" eaLnBrk="1" fontAlgn="auto" latinLnBrk="0" hangingPunct="1">
+                        <a:lnSpc>
+                          <a:spcPct val="100000"/>
+                        </a:lnSpc>
+                        <a:spcBef>
+                          <a:spcPts val="0"/>
+                        </a:spcBef>
+                        <a:spcAft>
+                          <a:spcPts val="0"/>
+                        </a:spcAft>
+                        <a:buClrTx/>
+                        <a:buSzTx/>
+                        <a:buFontTx/>
+                        <a:buNone/>
+                        <a:tabLst/>
+                        <a:defRPr/>
+                      </a:pPr>
+                      <a:r>
+                        <a:rPr lang="en-US"/>
+                        <a:t>…</a:t>
+                      </a:r>
+                      <a:endParaRPr lang="he-IL"/>
+                    </a:p>
+                    <a:p>
+                      <a:pPr algn="ctr" rtl="1"/>
+                      <a:endParaRPr lang="he-IL"/>
+                    </a:p>
+                  </a:txBody>
+                  <a:tcPr/>
+                </a:tc>
+                <a:tc>
+                  <a:txBody>
+                    <a:bodyPr/>
+                    <a:lstStyle/>
+                    <a:p>
+                      <a:pPr marL="0" marR="0" lvl="0" indent="0" algn="ctr" defTabSz="914400" rtl="1" eaLnBrk="1" fontAlgn="auto" latinLnBrk="0" hangingPunct="1">
+                        <a:lnSpc>
+                          <a:spcPct val="100000"/>
+                        </a:lnSpc>
+                        <a:spcBef>
+                          <a:spcPts val="0"/>
+                        </a:spcBef>
+                        <a:spcAft>
+                          <a:spcPts val="0"/>
+                        </a:spcAft>
+                        <a:buClrTx/>
+                        <a:buSzTx/>
+                        <a:buFontTx/>
+                        <a:buNone/>
+                        <a:tabLst/>
+                        <a:defRPr/>
+                      </a:pPr>
+                      <a:r>
+                        <a:rPr lang="en-US"/>
+                        <a:t>…</a:t>
+                      </a:r>
+                      <a:endParaRPr lang="he-IL"/>
+                    </a:p>
+                    <a:p>
+                      <a:pPr algn="ctr" rtl="1"/>
+                      <a:endParaRPr lang="he-IL"/>
+                    </a:p>
+                  </a:txBody>
+                  <a:tcPr/>
+                </a:tc>
+                <a:tc>
+                  <a:txBody>
+                    <a:bodyPr/>
+                    <a:lstStyle/>
+                    <a:p>
+                      <a:pPr marL="0" marR="0" lvl="0" indent="0" algn="ctr" defTabSz="914400" rtl="1" eaLnBrk="1" fontAlgn="auto" latinLnBrk="0" hangingPunct="1">
+                        <a:lnSpc>
+                          <a:spcPct val="100000"/>
+                        </a:lnSpc>
+                        <a:spcBef>
+                          <a:spcPts val="0"/>
+                        </a:spcBef>
+                        <a:spcAft>
+                          <a:spcPts val="0"/>
+                        </a:spcAft>
+                        <a:buClrTx/>
+                        <a:buSzTx/>
+                        <a:buFontTx/>
+                        <a:buNone/>
+                        <a:tabLst/>
+                        <a:defRPr/>
+                      </a:pPr>
+                      <a:r>
+                        <a:rPr lang="en-US"/>
+                        <a:t>C/n</a:t>
+                      </a:r>
+                      <a:endParaRPr lang="he-IL"/>
+                    </a:p>
+                  </a:txBody>
+                  <a:tcPr/>
+                </a:tc>
+                <a:extLst>
+                  <a:ext uri="{0D108BD9-81ED-4DB2-BD59-A6C34878D82A}">
+                    <a16:rowId xmlns:a16="http://schemas.microsoft.com/office/drawing/2014/main" val="971123263"/>
+                  </a:ext>
+                </a:extLst>
+              </a:tr>
+              <a:tr h="523504">
+                <a:tc>
+                  <a:txBody>
+                    <a:bodyPr/>
+                    <a:lstStyle/>
+                    <a:p>
+                      <a:pPr algn="ctr" rtl="1"/>
+                      <a:r>
+                        <a:rPr lang="he-IL"/>
+                        <a:t>סה"כ</a:t>
+                      </a:r>
+                    </a:p>
+                  </a:txBody>
+                  <a:tcPr/>
+                </a:tc>
+                <a:tc>
+                  <a:txBody>
+                    <a:bodyPr/>
+                    <a:lstStyle/>
+                    <a:p>
+                      <a:pPr algn="ctr" rtl="1"/>
+                      <a:r>
+                        <a:rPr lang="en-US"/>
+                        <a:t>d</a:t>
+                      </a:r>
+                      <a:r>
+                        <a:rPr lang="en-US" baseline="-25000"/>
+                        <a:t>1</a:t>
+                      </a:r>
+                      <a:endParaRPr lang="he-IL" baseline="-25000"/>
+                    </a:p>
+                  </a:txBody>
+                  <a:tcPr/>
+                </a:tc>
+                <a:tc>
+                  <a:txBody>
+                    <a:bodyPr/>
+                    <a:lstStyle/>
+                    <a:p>
+                      <a:pPr algn="ctr" rtl="1"/>
+                      <a:r>
+                        <a:rPr lang="en-US"/>
+                        <a:t>d</a:t>
+                      </a:r>
+                      <a:r>
+                        <a:rPr lang="en-US" baseline="-25000"/>
+                        <a:t>2</a:t>
+                      </a:r>
+                      <a:endParaRPr lang="he-IL" baseline="-25000"/>
+                    </a:p>
+                  </a:txBody>
+                  <a:tcPr/>
+                </a:tc>
+                <a:tc>
+                  <a:txBody>
+                    <a:bodyPr/>
+                    <a:lstStyle/>
+                    <a:p>
+                      <a:pPr algn="ctr" rtl="1"/>
+                      <a:r>
+                        <a:rPr lang="en-US"/>
+                        <a:t>d</a:t>
+                      </a:r>
+                      <a:r>
+                        <a:rPr lang="en-US" baseline="-25000"/>
+                        <a:t>3</a:t>
+                      </a:r>
+                      <a:endParaRPr lang="he-IL" baseline="-25000"/>
+                    </a:p>
+                  </a:txBody>
+                  <a:tcPr/>
+                </a:tc>
+                <a:tc>
+                  <a:txBody>
+                    <a:bodyPr/>
+                    <a:lstStyle/>
+                    <a:p>
+                      <a:pPr algn="ctr" rtl="1"/>
+                      <a:r>
+                        <a:rPr lang="en-US"/>
+                        <a:t>d</a:t>
+                      </a:r>
+                      <a:r>
+                        <a:rPr lang="en-US" baseline="-25000"/>
+                        <a:t>4</a:t>
+                      </a:r>
+                      <a:endParaRPr lang="he-IL" baseline="-25000"/>
+                    </a:p>
+                  </a:txBody>
+                  <a:tcPr/>
+                </a:tc>
+                <a:tc>
+                  <a:txBody>
+                    <a:bodyPr/>
+                    <a:lstStyle/>
+                    <a:p>
+                      <a:pPr algn="ctr" rtl="1"/>
+                      <a:r>
+                        <a:rPr lang="en-US"/>
+                        <a:t>C</a:t>
+                      </a:r>
+                      <a:endParaRPr lang="he-IL"/>
+                    </a:p>
+                  </a:txBody>
+                  <a:tcPr/>
+                </a:tc>
+                <a:extLst>
+                  <a:ext uri="{0D108BD9-81ED-4DB2-BD59-A6C34878D82A}">
+                    <a16:rowId xmlns:a16="http://schemas.microsoft.com/office/drawing/2014/main" val="380183865"/>
+                  </a:ext>
+                </a:extLst>
+              </a:tr>
+            </a:tbl>
+          </a:graphicData>
+        </a:graphic>
+      </p:graphicFrame>
+    </p:spTree>
+    <p:extLst>
+      <p:ext uri="{BB962C8B-B14F-4D97-AF65-F5344CB8AC3E}">
+        <p14:creationId xmlns:p14="http://schemas.microsoft.com/office/powerpoint/2010/main" val="3413107920"/>
+      </p:ext>
+    </p:extLst>
+  </p:cSld>
+  <p:clrMapOvr>
+    <a:masterClrMapping/>
+  </p:clrMapOvr>
+</p:sld>
+</file>
+
+<file path=ppt/slides/slide9.xml><?xml version="1.0" encoding="utf-8"?>
+<p:sld xmlns:a="http://schemas.openxmlformats.org/drawingml/2006/main" xmlns:r="http://schemas.openxmlformats.org/officeDocument/2006/relationships" xmlns:p="http://schemas.openxmlformats.org/presentationml/2006/main">
   <p:cSld name="page8">
     <p:spTree>
       <p:nvGrpSpPr>
@@ -32814,1030 +34854,6 @@
                                           <p:spTgt spid="4">
                                             <p:txEl>
                                               <p:pRg st="0" end="0"/>
-                                            </p:txEl>
-                                          </p:spTgt>
-                                        </p:tgtEl>
-                                        <p:attrNameLst>
-                                          <p:attrName>style.visibility</p:attrName>
-                                        </p:attrNameLst>
-                                      </p:cBhvr>
-                                      <p:to>
-                                        <p:strVal val="visible"/>
-                                      </p:to>
-                                    </p:set>
-                                  </p:childTnLst>
-                                </p:cTn>
-                              </p:par>
-                            </p:childTnLst>
-                          </p:cTn>
-                        </p:par>
-                      </p:childTnLst>
-                    </p:cTn>
-                  </p:par>
-                </p:childTnLst>
-              </p:cTn>
-              <p:prevCondLst>
-                <p:cond evt="onPrev" delay="0">
-                  <p:tgtEl>
-                    <p:sldTgt/>
-                  </p:tgtEl>
-                </p:cond>
-              </p:prevCondLst>
-              <p:nextCondLst>
-                <p:cond evt="onNext" delay="0">
-                  <p:tgtEl>
-                    <p:sldTgt/>
-                  </p:tgtEl>
-                </p:cond>
-              </p:nextCondLst>
-            </p:seq>
-          </p:childTnLst>
-        </p:cTn>
-      </p:par>
-    </p:tnLst>
-  </p:timing>
-</p:sld>
-</file>
-
-<file path=ppt/slides/slide9.xml><?xml version="1.0" encoding="utf-8"?>
-<p:sld xmlns:a="http://schemas.openxmlformats.org/drawingml/2006/main" xmlns:r="http://schemas.openxmlformats.org/officeDocument/2006/relationships" xmlns:p="http://schemas.openxmlformats.org/presentationml/2006/main">
-  <p:cSld name="page9">
-    <p:spTree>
-      <p:nvGrpSpPr>
-        <p:cNvPr id="1" name=""/>
-        <p:cNvGrpSpPr/>
-        <p:nvPr/>
-      </p:nvGrpSpPr>
-      <p:grpSpPr>
-        <a:xfrm>
-          <a:off x="0" y="0"/>
-          <a:ext cx="0" cy="0"/>
-          <a:chOff x="0" y="0"/>
-          <a:chExt cx="0" cy="0"/>
-        </a:xfrm>
-      </p:grpSpPr>
-      <p:sp>
-        <p:nvSpPr>
-          <p:cNvPr id="2" name="Title 1">
-            <a:extLst>
-              <a:ext uri="{FF2B5EF4-FFF2-40B4-BE49-F238E27FC236}">
-                <a16:creationId xmlns:a16="http://schemas.microsoft.com/office/drawing/2014/main" id="{A71EC15D-F6DD-0D96-0ACC-DF963B29AFC6}"/>
-              </a:ext>
-            </a:extLst>
-          </p:cNvPr>
-          <p:cNvSpPr txBox="1">
-            <a:spLocks noGrp="1"/>
-          </p:cNvSpPr>
-          <p:nvPr>
-            <p:ph type="title" idx="4294967295"/>
-          </p:nvPr>
-        </p:nvSpPr>
-        <p:spPr>
-          <a:xfrm>
-            <a:off x="0" y="-272160"/>
-            <a:ext cx="10080720" cy="1460880"/>
-          </a:xfrm>
-        </p:spPr>
-        <p:txBody>
-          <a:bodyPr vert="horz" wrap="square" lIns="91440" tIns="45720" rIns="91440" bIns="45720">
-            <a:noAutofit/>
-          </a:bodyPr>
-          <a:lstStyle/>
-          <a:p>
-            <a:pPr lvl="0" rtl="1" hangingPunct="1">
-              <a:lnSpc>
-                <a:spcPct val="90000"/>
-              </a:lnSpc>
-            </a:pPr>
-            <a:r>
-              <a:rPr lang="he-IL" sz="5400">
-                <a:solidFill>
-                  <a:srgbClr val="000000"/>
-                </a:solidFill>
-                <a:latin typeface="Liberation Sans" pitchFamily="34"/>
-                <a:cs typeface="Liberation Sans" pitchFamily="34"/>
-              </a:rPr>
-              <a:t>אלגוריתם נאש – מיקסום המכפלה</a:t>
-            </a:r>
-          </a:p>
-        </p:txBody>
-      </p:sp>
-      <p:sp>
-        <p:nvSpPr>
-          <p:cNvPr id="3" name="Content Placeholder 2">
-            <a:extLst>
-              <a:ext uri="{FF2B5EF4-FFF2-40B4-BE49-F238E27FC236}">
-                <a16:creationId xmlns:a16="http://schemas.microsoft.com/office/drawing/2014/main" id="{151BA45C-08F8-6ADD-7093-1A0E563D70D8}"/>
-              </a:ext>
-            </a:extLst>
-          </p:cNvPr>
-          <p:cNvSpPr txBox="1"/>
-          <p:nvPr/>
-        </p:nvSpPr>
-        <p:spPr>
-          <a:xfrm>
-            <a:off x="457200" y="1188719"/>
-            <a:ext cx="8694360" cy="4796280"/>
-          </a:xfrm>
-          <a:prstGeom prst="rect">
-            <a:avLst/>
-          </a:prstGeom>
-          <a:noFill/>
-          <a:ln>
-            <a:noFill/>
-          </a:ln>
-        </p:spPr>
-        <p:txBody>
-          <a:bodyPr vert="horz" wrap="square" lIns="91440" tIns="45720" rIns="91440" bIns="45720" anchor="t" compatLnSpc="0">
-            <a:noAutofit/>
-          </a:bodyPr>
-          <a:lstStyle/>
-          <a:p>
-            <a:pPr marL="0" marR="0" lvl="0" indent="0" algn="l" rtl="0" hangingPunct="0">
-              <a:spcBef>
-                <a:spcPts val="2750"/>
-              </a:spcBef>
-              <a:spcAft>
-                <a:spcPts val="0"/>
-              </a:spcAft>
-              <a:buNone/>
-              <a:tabLst/>
-            </a:pPr>
-            <a:endParaRPr lang="en-US" sz="3000" b="0" i="0" u="none" strike="noStrike" kern="1200" spc="0">
-              <a:ln>
-                <a:noFill/>
-              </a:ln>
-              <a:solidFill>
-                <a:srgbClr val="000000"/>
-              </a:solidFill>
-              <a:latin typeface="ＭＳ Ｐゴシック" pitchFamily="18"/>
-              <a:ea typeface="Liberation Sans" pitchFamily="34"/>
-              <a:cs typeface="DejaVu Sans" pitchFamily="2"/>
-            </a:endParaRPr>
-          </a:p>
-        </p:txBody>
-      </p:sp>
-      <p:sp>
-        <p:nvSpPr>
-          <p:cNvPr id="4" name="TextBox 3">
-            <a:extLst>
-              <a:ext uri="{FF2B5EF4-FFF2-40B4-BE49-F238E27FC236}">
-                <a16:creationId xmlns:a16="http://schemas.microsoft.com/office/drawing/2014/main" id="{BF0EC652-E463-4888-D8B6-A259326BF5F0}"/>
-              </a:ext>
-            </a:extLst>
-          </p:cNvPr>
-          <p:cNvSpPr txBox="1"/>
-          <p:nvPr/>
-        </p:nvSpPr>
-        <p:spPr>
-          <a:xfrm>
-            <a:off x="193992" y="839648"/>
-            <a:ext cx="9692640" cy="6844587"/>
-          </a:xfrm>
-          <a:prstGeom prst="rect">
-            <a:avLst/>
-          </a:prstGeom>
-          <a:noFill/>
-          <a:ln>
-            <a:noFill/>
-          </a:ln>
-        </p:spPr>
-        <p:txBody>
-          <a:bodyPr vert="horz" wrap="square" lIns="90000" tIns="45000" rIns="90000" bIns="45000" anchorCtr="0" compatLnSpc="0">
-            <a:spAutoFit/>
-          </a:bodyPr>
-          <a:lstStyle/>
-          <a:p>
-            <a:pPr marL="0" marR="0" lvl="0" indent="0" algn="r" rtl="1" hangingPunct="0">
-              <a:lnSpc>
-                <a:spcPct val="100000"/>
-              </a:lnSpc>
-              <a:spcBef>
-                <a:spcPts val="0"/>
-              </a:spcBef>
-              <a:spcAft>
-                <a:spcPts val="0"/>
-              </a:spcAft>
-              <a:buNone/>
-              <a:tabLst/>
-            </a:pPr>
-            <a:r>
-              <a:rPr lang="he-IL" sz="4000" b="1" i="0" u="none" strike="noStrike" kern="1200" cap="none">
-                <a:ln>
-                  <a:noFill/>
-                </a:ln>
-                <a:latin typeface="Liberation Sans" pitchFamily="34"/>
-                <a:ea typeface="Noto Sans CJK SC Regular" pitchFamily="2"/>
-                <a:cs typeface="Liberation Sans" pitchFamily="34"/>
-              </a:rPr>
-              <a:t>הגדרה. </a:t>
-            </a:r>
-            <a:r>
-              <a:rPr lang="he-IL" sz="4000" b="0" i="1" u="none" strike="noStrike" kern="1200" cap="none">
-                <a:ln>
-                  <a:noFill/>
-                </a:ln>
-                <a:latin typeface="Liberation Sans" pitchFamily="34"/>
-                <a:ea typeface="Noto Sans CJK SC Regular" pitchFamily="2"/>
-                <a:cs typeface="Liberation Sans" pitchFamily="34"/>
-              </a:rPr>
-              <a:t>תקציב נאש </a:t>
-            </a:r>
-            <a:r>
-              <a:rPr lang="he-IL" sz="4000" b="0" i="0" u="none" strike="noStrike" kern="1200" cap="none">
-                <a:ln>
-                  <a:noFill/>
-                </a:ln>
-                <a:latin typeface="Liberation Sans" pitchFamily="34"/>
-                <a:ea typeface="Noto Sans CJK SC Regular" pitchFamily="2"/>
-                <a:cs typeface="Liberation Sans" pitchFamily="34"/>
-              </a:rPr>
-              <a:t>הוא תקציב הממקסם את </a:t>
-            </a:r>
-            <a:r>
-              <a:rPr lang="he-IL" sz="4000" b="0" i="1" u="none" strike="noStrike" kern="1200" cap="none">
-                <a:ln>
-                  <a:noFill/>
-                </a:ln>
-                <a:latin typeface="Liberation Sans" pitchFamily="34"/>
-                <a:ea typeface="Noto Sans CJK SC Regular" pitchFamily="2"/>
-                <a:cs typeface="Liberation Sans" pitchFamily="34"/>
-              </a:rPr>
-              <a:t>מכפלת התועלות </a:t>
-            </a:r>
-            <a:r>
-              <a:rPr lang="he-IL" sz="4000" b="0" i="0" u="none" strike="noStrike" kern="1200" cap="none">
-                <a:ln>
-                  <a:noFill/>
-                </a:ln>
-                <a:latin typeface="Liberation Sans" pitchFamily="34"/>
-                <a:ea typeface="Noto Sans CJK SC Regular" pitchFamily="2"/>
-                <a:cs typeface="Liberation Sans" pitchFamily="34"/>
-              </a:rPr>
-              <a:t>של האזרחים:</a:t>
-            </a:r>
-          </a:p>
-          <a:p>
-            <a:pPr marL="0" marR="0" lvl="0" indent="0" algn="l" rtl="0" hangingPunct="0">
-              <a:lnSpc>
-                <a:spcPct val="100000"/>
-              </a:lnSpc>
-              <a:spcBef>
-                <a:spcPts val="0"/>
-              </a:spcBef>
-              <a:spcAft>
-                <a:spcPts val="0"/>
-              </a:spcAft>
-              <a:buNone/>
-              <a:tabLst/>
-            </a:pPr>
-            <a:r>
-              <a:rPr lang="en-US" sz="4000" b="0" i="0" u="none" strike="noStrike" kern="1200" cap="none" baseline="2000">
-                <a:ln>
-                  <a:noFill/>
-                </a:ln>
-                <a:latin typeface="Liberation Sans" pitchFamily="34"/>
-                <a:ea typeface="David CLM" pitchFamily="2"/>
-                <a:cs typeface="Liberation Sans" pitchFamily="34"/>
-              </a:rPr>
-              <a:t>max[d]  product[i]  u</a:t>
-            </a:r>
-            <a:r>
-              <a:rPr lang="en-US" sz="4000" b="0" i="0" u="none" strike="noStrike" kern="1200" cap="none" baseline="-7000">
-                <a:ln>
-                  <a:noFill/>
-                </a:ln>
-                <a:latin typeface="Liberation Sans" pitchFamily="34"/>
-                <a:ea typeface="David CLM" pitchFamily="2"/>
-                <a:cs typeface="Liberation Sans" pitchFamily="34"/>
-              </a:rPr>
-              <a:t>i</a:t>
-            </a:r>
-            <a:r>
-              <a:rPr lang="en-US" sz="4000" b="0" i="0" u="none" strike="noStrike" kern="1200" cap="none" baseline="2000">
-                <a:ln>
-                  <a:noFill/>
-                </a:ln>
-                <a:latin typeface="Liberation Sans" pitchFamily="34"/>
-                <a:ea typeface="David CLM" pitchFamily="2"/>
-                <a:cs typeface="Liberation Sans" pitchFamily="34"/>
-              </a:rPr>
-              <a:t>(d).</a:t>
-            </a:r>
-          </a:p>
-          <a:p>
-            <a:pPr marL="571500" marR="0" lvl="0" indent="-571500" algn="r" rtl="1" hangingPunct="0">
-              <a:lnSpc>
-                <a:spcPct val="100000"/>
-              </a:lnSpc>
-              <a:spcBef>
-                <a:spcPts val="0"/>
-              </a:spcBef>
-              <a:spcAft>
-                <a:spcPts val="0"/>
-              </a:spcAft>
-              <a:buSzPct val="45000"/>
-              <a:buFont typeface="Arial" panose="020B0604020202020204" pitchFamily="34" charset="0"/>
-              <a:buChar char="•"/>
-              <a:tabLst/>
-            </a:pPr>
-            <a:r>
-              <a:rPr lang="he-IL" sz="4000" b="0" i="1" u="none" strike="noStrike" kern="1200" cap="none" baseline="2000">
-                <a:ln>
-                  <a:noFill/>
-                </a:ln>
-                <a:solidFill>
-                  <a:srgbClr val="9933FF"/>
-                </a:solidFill>
-                <a:latin typeface="Liberation Sans" pitchFamily="34"/>
-                <a:ea typeface="David CLM" pitchFamily="2"/>
-                <a:cs typeface="Liberation Sans" pitchFamily="34"/>
-              </a:rPr>
-              <a:t>הגדרה שקולה</a:t>
-            </a:r>
-            <a:r>
-              <a:rPr lang="he-IL" sz="4000" b="0" i="0" u="none" strike="noStrike" kern="1200" cap="none" baseline="2000">
-                <a:ln>
-                  <a:noFill/>
-                </a:ln>
-                <a:solidFill>
-                  <a:srgbClr val="9933FF"/>
-                </a:solidFill>
-                <a:latin typeface="Liberation Sans" pitchFamily="34"/>
-                <a:ea typeface="David CLM" pitchFamily="2"/>
-                <a:cs typeface="Liberation Sans" pitchFamily="34"/>
-              </a:rPr>
-              <a:t>: </a:t>
-            </a:r>
-            <a:r>
-              <a:rPr lang="en-US" sz="4000" b="0" i="0" u="none" strike="noStrike" kern="1200" cap="none" baseline="2000">
-                <a:ln>
-                  <a:noFill/>
-                </a:ln>
-                <a:solidFill>
-                  <a:srgbClr val="9933FF"/>
-                </a:solidFill>
-                <a:latin typeface="Liberation Sans" pitchFamily="34"/>
-                <a:ea typeface="David CLM" pitchFamily="2"/>
-                <a:cs typeface="Liberation Sans" pitchFamily="34"/>
-              </a:rPr>
-              <a:t>מיקסום סכום הלוגריתמים:</a:t>
-            </a:r>
-          </a:p>
-          <a:p>
-            <a:pPr marL="571500" marR="0" lvl="0" indent="-571500" algn="r" rtl="1" hangingPunct="0">
-              <a:lnSpc>
-                <a:spcPct val="100000"/>
-              </a:lnSpc>
-              <a:spcBef>
-                <a:spcPts val="0"/>
-              </a:spcBef>
-              <a:spcAft>
-                <a:spcPts val="0"/>
-              </a:spcAft>
-              <a:buFont typeface="Arial" panose="020B0604020202020204" pitchFamily="34" charset="0"/>
-              <a:buChar char="•"/>
-              <a:tabLst/>
-            </a:pPr>
-            <a:r>
-              <a:rPr lang="en-US" sz="4000" b="0" i="0" u="none" strike="noStrike" kern="1200" cap="none" baseline="2000">
-                <a:ln>
-                  <a:noFill/>
-                </a:ln>
-                <a:solidFill>
-                  <a:srgbClr val="9933FF"/>
-                </a:solidFill>
-                <a:latin typeface="Liberation Sans" pitchFamily="34"/>
-                <a:ea typeface="David CLM" pitchFamily="2"/>
-                <a:cs typeface="Liberation Sans" pitchFamily="34"/>
-              </a:rPr>
-              <a:t>max[d] sum[i] log(u</a:t>
-            </a:r>
-            <a:r>
-              <a:rPr lang="en-US" sz="4000" b="0" i="0" u="none" strike="noStrike" kern="1200" cap="none" baseline="-7000">
-                <a:ln>
-                  <a:noFill/>
-                </a:ln>
-                <a:solidFill>
-                  <a:srgbClr val="9933FF"/>
-                </a:solidFill>
-                <a:latin typeface="Liberation Sans" pitchFamily="34"/>
-                <a:ea typeface="David CLM" pitchFamily="2"/>
-                <a:cs typeface="Liberation Sans" pitchFamily="34"/>
-              </a:rPr>
-              <a:t>i</a:t>
-            </a:r>
-            <a:r>
-              <a:rPr lang="en-US" sz="4000" b="0" i="0" u="none" strike="noStrike" kern="1200" cap="none" baseline="2000">
-                <a:ln>
-                  <a:noFill/>
-                </a:ln>
-                <a:solidFill>
-                  <a:srgbClr val="9933FF"/>
-                </a:solidFill>
-                <a:latin typeface="Liberation Sans" pitchFamily="34"/>
-                <a:ea typeface="David CLM" pitchFamily="2"/>
-                <a:cs typeface="Liberation Sans" pitchFamily="34"/>
-              </a:rPr>
-              <a:t>(d))</a:t>
-            </a:r>
-            <a:r>
-              <a:rPr lang="he-IL" sz="4000" b="0" i="0" u="none" strike="noStrike" kern="1200" cap="none" baseline="2000">
-                <a:ln>
-                  <a:noFill/>
-                </a:ln>
-                <a:solidFill>
-                  <a:srgbClr val="9933FF"/>
-                </a:solidFill>
-                <a:latin typeface="Liberation Sans" pitchFamily="34"/>
-                <a:ea typeface="David CLM" pitchFamily="2"/>
-                <a:cs typeface="Liberation Sans" pitchFamily="34"/>
-              </a:rPr>
-              <a:t>.</a:t>
-            </a:r>
-            <a:endParaRPr lang="en-US" sz="4000" b="0" i="0" u="none" strike="noStrike" kern="1200" cap="none" baseline="2000">
-              <a:ln>
-                <a:noFill/>
-              </a:ln>
-              <a:solidFill>
-                <a:srgbClr val="9933FF"/>
-              </a:solidFill>
-              <a:latin typeface="Liberation Sans" pitchFamily="34"/>
-              <a:ea typeface="David CLM" pitchFamily="2"/>
-              <a:cs typeface="Liberation Sans" pitchFamily="34"/>
-            </a:endParaRPr>
-          </a:p>
-          <a:p>
-            <a:pPr marL="571500" marR="0" lvl="0" indent="-571500" algn="r" rtl="1" hangingPunct="0">
-              <a:lnSpc>
-                <a:spcPct val="100000"/>
-              </a:lnSpc>
-              <a:spcBef>
-                <a:spcPts val="0"/>
-              </a:spcBef>
-              <a:spcAft>
-                <a:spcPts val="0"/>
-              </a:spcAft>
-              <a:buSzPct val="45000"/>
-              <a:buFont typeface="Arial" panose="020B0604020202020204" pitchFamily="34" charset="0"/>
-              <a:buChar char="•"/>
-              <a:tabLst/>
-            </a:pPr>
-            <a:r>
-              <a:rPr lang="he-IL" sz="4000" b="0" i="1" u="none" strike="noStrike" kern="1200" cap="none">
-                <a:ln>
-                  <a:noFill/>
-                </a:ln>
-                <a:solidFill>
-                  <a:srgbClr val="0066FF"/>
-                </a:solidFill>
-                <a:latin typeface="Liberation Sans" pitchFamily="34"/>
-                <a:ea typeface="Noto Sans CJK SC Regular" pitchFamily="2"/>
-                <a:cs typeface="Liberation Sans" pitchFamily="34"/>
-              </a:rPr>
-              <a:t>חישוב</a:t>
-            </a:r>
-            <a:r>
-              <a:rPr lang="he-IL" sz="4000" b="0" i="0" u="none" strike="noStrike" kern="1200" cap="none">
-                <a:ln>
-                  <a:noFill/>
-                </a:ln>
-                <a:solidFill>
-                  <a:srgbClr val="0066FF"/>
-                </a:solidFill>
-                <a:latin typeface="Liberation Sans" pitchFamily="34"/>
-                <a:ea typeface="Noto Sans CJK SC Regular" pitchFamily="2"/>
-                <a:cs typeface="Liberation Sans" pitchFamily="34"/>
-              </a:rPr>
-              <a:t>:</a:t>
-            </a:r>
-            <a:r>
-              <a:rPr lang="en-US" sz="4000" b="0" i="0" u="none" strike="noStrike" kern="1200" cap="none">
-                <a:ln>
-                  <a:noFill/>
-                </a:ln>
-                <a:solidFill>
-                  <a:srgbClr val="0066FF"/>
-                </a:solidFill>
-                <a:latin typeface="Liberation Sans" pitchFamily="34"/>
-                <a:ea typeface="Noto Sans CJK SC Regular" pitchFamily="2"/>
-                <a:cs typeface="Liberation Sans" pitchFamily="34"/>
-              </a:rPr>
-              <a:t> פתרון בעיית אופטימיזציה קמורה – ראו בתיקיית הקוד.</a:t>
-            </a:r>
-          </a:p>
-          <a:p>
-            <a:pPr marL="0" marR="0" lvl="0" indent="0" algn="r" rtl="1" hangingPunct="0">
-              <a:lnSpc>
-                <a:spcPct val="100000"/>
-              </a:lnSpc>
-              <a:spcBef>
-                <a:spcPts val="0"/>
-              </a:spcBef>
-              <a:spcAft>
-                <a:spcPts val="0"/>
-              </a:spcAft>
-              <a:buNone/>
-              <a:tabLst/>
-            </a:pPr>
-            <a:endParaRPr lang="en-US" sz="1800" b="0" i="0" u="none" strike="noStrike" kern="1200" cap="none">
-              <a:ln>
-                <a:noFill/>
-              </a:ln>
-              <a:latin typeface="Liberation Sans" pitchFamily="18"/>
-              <a:ea typeface="Noto Sans CJK SC Regular" pitchFamily="2"/>
-              <a:cs typeface="Nachlieli CLM" pitchFamily="2"/>
-            </a:endParaRPr>
-          </a:p>
-          <a:p>
-            <a:pPr marL="0" marR="0" lvl="0" indent="0" algn="r" rtl="1" hangingPunct="0">
-              <a:lnSpc>
-                <a:spcPct val="100000"/>
-              </a:lnSpc>
-              <a:spcBef>
-                <a:spcPts val="0"/>
-              </a:spcBef>
-              <a:spcAft>
-                <a:spcPts val="0"/>
-              </a:spcAft>
-              <a:buNone/>
-              <a:tabLst/>
-            </a:pPr>
-            <a:r>
-              <a:rPr lang="he-IL" sz="4000" b="1" i="0" u="none" strike="noStrike" kern="1200" cap="none">
-                <a:ln>
-                  <a:noFill/>
-                </a:ln>
-                <a:solidFill>
-                  <a:srgbClr val="00CC00"/>
-                </a:solidFill>
-                <a:latin typeface="Liberation Sans" pitchFamily="34"/>
-                <a:ea typeface="Noto Sans CJK SC Regular" pitchFamily="2"/>
-                <a:cs typeface="Liberation Sans" pitchFamily="34"/>
-              </a:rPr>
-              <a:t>משפט</a:t>
-            </a:r>
-            <a:r>
-              <a:rPr lang="he-IL" sz="4000" b="0" i="0" u="none" strike="noStrike" kern="1200" cap="none">
-                <a:ln>
-                  <a:noFill/>
-                </a:ln>
-                <a:solidFill>
-                  <a:srgbClr val="00CC00"/>
-                </a:solidFill>
-                <a:latin typeface="Liberation Sans" pitchFamily="34"/>
-                <a:ea typeface="Noto Sans CJK SC Regular" pitchFamily="2"/>
-                <a:cs typeface="Liberation Sans" pitchFamily="34"/>
-              </a:rPr>
-              <a:t>. </a:t>
-            </a:r>
-            <a:r>
-              <a:rPr lang="en-US" sz="4000" b="0" i="0" u="none" strike="noStrike" kern="1200" cap="none">
-                <a:ln>
-                  <a:noFill/>
-                </a:ln>
-                <a:solidFill>
-                  <a:srgbClr val="00CC00"/>
-                </a:solidFill>
-                <a:latin typeface="Liberation Sans" pitchFamily="34"/>
-                <a:ea typeface="Noto Sans CJK SC Regular" pitchFamily="2"/>
-                <a:cs typeface="Liberation Sans" pitchFamily="34"/>
-              </a:rPr>
-              <a:t>כל תקציב נאש הוא יעיל-פארטו.</a:t>
-            </a:r>
-          </a:p>
-          <a:p>
-            <a:pPr marL="0" marR="0" lvl="0" indent="0" algn="r" rtl="1" hangingPunct="0">
-              <a:lnSpc>
-                <a:spcPct val="100000"/>
-              </a:lnSpc>
-              <a:spcBef>
-                <a:spcPts val="0"/>
-              </a:spcBef>
-              <a:spcAft>
-                <a:spcPts val="0"/>
-              </a:spcAft>
-              <a:buNone/>
-              <a:tabLst/>
-            </a:pPr>
-            <a:r>
-              <a:rPr lang="he-IL" sz="4000" b="0" i="1" u="none" strike="noStrike" kern="1200" cap="none">
-                <a:ln>
-                  <a:noFill/>
-                </a:ln>
-                <a:latin typeface="Liberation Sans" pitchFamily="34"/>
-                <a:ea typeface="David CLM" pitchFamily="2"/>
-                <a:cs typeface="Liberation Sans" pitchFamily="34"/>
-              </a:rPr>
-              <a:t>הוכחה</a:t>
-            </a:r>
-            <a:r>
-              <a:rPr lang="en-US" sz="4000" b="0" i="0" u="none" strike="noStrike" kern="1200" cap="none">
-                <a:ln>
-                  <a:noFill/>
-                </a:ln>
-                <a:latin typeface="Liberation Sans" pitchFamily="34"/>
-                <a:ea typeface="David CLM" pitchFamily="2"/>
-                <a:cs typeface="Liberation Sans" pitchFamily="34"/>
-              </a:rPr>
-              <a:t>. הוכחנו בשיעור 2</a:t>
-            </a:r>
-            <a:r>
-              <a:rPr lang="he-IL" sz="4000" b="0" i="0" u="none" strike="noStrike" kern="1200" cap="none">
-                <a:ln>
-                  <a:noFill/>
-                </a:ln>
-                <a:latin typeface="Liberation Sans" pitchFamily="34"/>
-                <a:ea typeface="David CLM" pitchFamily="2"/>
-                <a:cs typeface="Liberation Sans" pitchFamily="34"/>
-              </a:rPr>
-              <a:t>. ***</a:t>
-            </a:r>
-            <a:endParaRPr lang="en-US" sz="4000" b="0" i="0" u="none" strike="noStrike" kern="1200" cap="none">
-              <a:ln>
-                <a:noFill/>
-              </a:ln>
-              <a:latin typeface="Liberation Sans" pitchFamily="34"/>
-              <a:ea typeface="David CLM" pitchFamily="2"/>
-              <a:cs typeface="Liberation Sans" pitchFamily="34"/>
-            </a:endParaRPr>
-          </a:p>
-          <a:p>
-            <a:pPr marL="0" marR="0" lvl="0" indent="0" algn="r" rtl="1" hangingPunct="0">
-              <a:lnSpc>
-                <a:spcPct val="100000"/>
-              </a:lnSpc>
-              <a:spcBef>
-                <a:spcPts val="0"/>
-              </a:spcBef>
-              <a:spcAft>
-                <a:spcPts val="0"/>
-              </a:spcAft>
-              <a:buNone/>
-              <a:tabLst/>
-            </a:pPr>
-            <a:endParaRPr lang="en-US" sz="4000" b="0" i="0" u="none" strike="noStrike" kern="1200" cap="none">
-              <a:ln>
-                <a:noFill/>
-              </a:ln>
-              <a:latin typeface="Liberation Sans" pitchFamily="34"/>
-              <a:ea typeface="David CLM" pitchFamily="2"/>
-              <a:cs typeface="Liberation Sans" pitchFamily="34"/>
-            </a:endParaRPr>
-          </a:p>
-          <a:p>
-            <a:pPr marL="0" marR="0" lvl="0" indent="0" algn="r" rtl="1" hangingPunct="0">
-              <a:lnSpc>
-                <a:spcPct val="100000"/>
-              </a:lnSpc>
-              <a:spcBef>
-                <a:spcPts val="0"/>
-              </a:spcBef>
-              <a:spcAft>
-                <a:spcPts val="0"/>
-              </a:spcAft>
-              <a:buNone/>
-              <a:tabLst/>
-            </a:pPr>
-            <a:r>
-              <a:rPr lang="he-IL" sz="4000" b="1" i="0" u="none" strike="noStrike" kern="1200" cap="none">
-                <a:ln>
-                  <a:noFill/>
-                </a:ln>
-                <a:solidFill>
-                  <a:srgbClr val="00CC00"/>
-                </a:solidFill>
-                <a:latin typeface="Liberation Sans" pitchFamily="34"/>
-                <a:ea typeface="David CLM" pitchFamily="2"/>
-                <a:cs typeface="Liberation Sans" pitchFamily="34"/>
-              </a:rPr>
-              <a:t>משפט</a:t>
-            </a:r>
-            <a:r>
-              <a:rPr lang="he-IL" sz="4000" b="0" i="0" u="none" strike="noStrike" kern="1200" cap="none">
-                <a:ln>
-                  <a:noFill/>
-                </a:ln>
-                <a:solidFill>
-                  <a:srgbClr val="00CC00"/>
-                </a:solidFill>
-                <a:latin typeface="Liberation Sans" pitchFamily="34"/>
-                <a:ea typeface="David CLM" pitchFamily="2"/>
-                <a:cs typeface="Liberation Sans" pitchFamily="34"/>
-              </a:rPr>
-              <a:t>. </a:t>
-            </a:r>
-            <a:r>
-              <a:rPr lang="en-US" sz="4000" b="0" i="0" u="none" strike="noStrike" kern="1200" cap="none">
-                <a:ln>
-                  <a:noFill/>
-                </a:ln>
-                <a:solidFill>
-                  <a:srgbClr val="00CC00"/>
-                </a:solidFill>
-                <a:latin typeface="Liberation Sans" pitchFamily="34"/>
-                <a:ea typeface="David CLM" pitchFamily="2"/>
-                <a:cs typeface="Liberation Sans" pitchFamily="34"/>
-              </a:rPr>
-              <a:t>כל תקציב נאש הוא פָרִיק</a:t>
-            </a:r>
-            <a:r>
-              <a:rPr lang="he-IL" sz="4000" b="0" i="0" u="none" strike="noStrike" kern="1200" cap="none">
-                <a:ln>
-                  <a:noFill/>
-                </a:ln>
-                <a:solidFill>
-                  <a:srgbClr val="00CC00"/>
-                </a:solidFill>
-                <a:latin typeface="Liberation Sans" pitchFamily="34"/>
-                <a:ea typeface="David CLM" pitchFamily="2"/>
-                <a:cs typeface="Liberation Sans" pitchFamily="34"/>
-              </a:rPr>
-              <a:t> &gt;</a:t>
-            </a:r>
-            <a:endParaRPr lang="en-US" sz="4000" b="0" i="0" u="none" strike="noStrike" kern="1200" cap="none">
-              <a:ln>
-                <a:noFill/>
-              </a:ln>
-              <a:solidFill>
-                <a:srgbClr val="00CC00"/>
-              </a:solidFill>
-              <a:latin typeface="Liberation Sans" pitchFamily="34"/>
-              <a:ea typeface="David CLM" pitchFamily="2"/>
-              <a:cs typeface="Liberation Sans" pitchFamily="34"/>
-            </a:endParaRPr>
-          </a:p>
-        </p:txBody>
-      </p:sp>
-    </p:spTree>
-  </p:cSld>
-  <p:clrMapOvr>
-    <a:masterClrMapping/>
-  </p:clrMapOvr>
-  <p:timing>
-    <p:tnLst>
-      <p:par>
-        <p:cTn id="1" dur="indefinite" restart="never" nodeType="tmRoot">
-          <p:childTnLst>
-            <p:seq concurrent="1" nextAc="seek">
-              <p:cTn id="2" dur="indefinite" nodeType="mainSeq">
-                <p:childTnLst>
-                  <p:par>
-                    <p:cTn id="3" fill="hold">
-                      <p:stCondLst>
-                        <p:cond delay="indefinite"/>
-                      </p:stCondLst>
-                      <p:childTnLst>
-                        <p:par>
-                          <p:cTn id="4" fill="hold">
-                            <p:stCondLst>
-                              <p:cond delay="0"/>
-                            </p:stCondLst>
-                            <p:childTnLst>
-                              <p:par>
-                                <p:cTn id="5" presetClass="entr" fill="hold" nodeType="clickEffect">
-                                  <p:stCondLst>
-                                    <p:cond delay="0"/>
-                                  </p:stCondLst>
-                                  <p:childTnLst>
-                                    <p:set>
-                                      <p:cBhvr>
-                                        <p:cTn id="6" dur="1" fill="hold">
-                                          <p:stCondLst>
-                                            <p:cond delay="0"/>
-                                          </p:stCondLst>
-                                        </p:cTn>
-                                        <p:tgtEl>
-                                          <p:spTgt spid="4">
-                                            <p:txEl>
-                                              <p:pRg st="2" end="2"/>
-                                            </p:txEl>
-                                          </p:spTgt>
-                                        </p:tgtEl>
-                                        <p:attrNameLst>
-                                          <p:attrName>style.visibility</p:attrName>
-                                        </p:attrNameLst>
-                                      </p:cBhvr>
-                                      <p:to>
-                                        <p:strVal val="visible"/>
-                                      </p:to>
-                                    </p:set>
-                                  </p:childTnLst>
-                                </p:cTn>
-                              </p:par>
-                              <p:par>
-                                <p:cTn id="7" presetClass="entr" fill="hold" nodeType="withEffect">
-                                  <p:stCondLst>
-                                    <p:cond delay="0"/>
-                                  </p:stCondLst>
-                                  <p:childTnLst>
-                                    <p:set>
-                                      <p:cBhvr>
-                                        <p:cTn id="8" dur="1" fill="hold">
-                                          <p:stCondLst>
-                                            <p:cond delay="0"/>
-                                          </p:stCondLst>
-                                        </p:cTn>
-                                        <p:tgtEl>
-                                          <p:spTgt spid="4">
-                                            <p:txEl>
-                                              <p:pRg st="3" end="3"/>
-                                            </p:txEl>
-                                          </p:spTgt>
-                                        </p:tgtEl>
-                                        <p:attrNameLst>
-                                          <p:attrName>style.visibility</p:attrName>
-                                        </p:attrNameLst>
-                                      </p:cBhvr>
-                                      <p:to>
-                                        <p:strVal val="visible"/>
-                                      </p:to>
-                                    </p:set>
-                                  </p:childTnLst>
-                                </p:cTn>
-                              </p:par>
-                            </p:childTnLst>
-                          </p:cTn>
-                        </p:par>
-                      </p:childTnLst>
-                    </p:cTn>
-                  </p:par>
-                  <p:par>
-                    <p:cTn id="9" fill="hold">
-                      <p:stCondLst>
-                        <p:cond delay="indefinite"/>
-                      </p:stCondLst>
-                      <p:childTnLst>
-                        <p:par>
-                          <p:cTn id="10" fill="hold">
-                            <p:stCondLst>
-                              <p:cond delay="0"/>
-                            </p:stCondLst>
-                            <p:childTnLst>
-                              <p:par>
-                                <p:cTn id="11" presetClass="entr" fill="hold" nodeType="clickEffect">
-                                  <p:stCondLst>
-                                    <p:cond delay="0"/>
-                                  </p:stCondLst>
-                                  <p:childTnLst>
-                                    <p:set>
-                                      <p:cBhvr>
-                                        <p:cTn id="12" dur="1" fill="hold">
-                                          <p:stCondLst>
-                                            <p:cond delay="0"/>
-                                          </p:stCondLst>
-                                        </p:cTn>
-                                        <p:tgtEl>
-                                          <p:spTgt spid="4">
-                                            <p:txEl>
-                                              <p:pRg st="4" end="4"/>
-                                            </p:txEl>
-                                          </p:spTgt>
-                                        </p:tgtEl>
-                                        <p:attrNameLst>
-                                          <p:attrName>style.visibility</p:attrName>
-                                        </p:attrNameLst>
-                                      </p:cBhvr>
-                                      <p:to>
-                                        <p:strVal val="visible"/>
-                                      </p:to>
-                                    </p:set>
-                                  </p:childTnLst>
-                                </p:cTn>
-                              </p:par>
-                            </p:childTnLst>
-                          </p:cTn>
-                        </p:par>
-                      </p:childTnLst>
-                    </p:cTn>
-                  </p:par>
-                  <p:par>
-                    <p:cTn id="13" fill="hold">
-                      <p:stCondLst>
-                        <p:cond delay="indefinite"/>
-                      </p:stCondLst>
-                      <p:childTnLst>
-                        <p:par>
-                          <p:cTn id="14" fill="hold">
-                            <p:stCondLst>
-                              <p:cond delay="0"/>
-                            </p:stCondLst>
-                            <p:childTnLst>
-                              <p:par>
-                                <p:cTn id="15" presetClass="entr" fill="hold" nodeType="clickEffect">
-                                  <p:stCondLst>
-                                    <p:cond delay="0"/>
-                                  </p:stCondLst>
-                                  <p:childTnLst>
-                                    <p:set>
-                                      <p:cBhvr>
-                                        <p:cTn id="16" dur="1" fill="hold">
-                                          <p:stCondLst>
-                                            <p:cond delay="0"/>
-                                          </p:stCondLst>
-                                        </p:cTn>
-                                        <p:tgtEl>
-                                          <p:spTgt spid="4">
-                                            <p:txEl>
-                                              <p:pRg st="6" end="6"/>
-                                            </p:txEl>
-                                          </p:spTgt>
-                                        </p:tgtEl>
-                                        <p:attrNameLst>
-                                          <p:attrName>style.visibility</p:attrName>
-                                        </p:attrNameLst>
-                                      </p:cBhvr>
-                                      <p:to>
-                                        <p:strVal val="visible"/>
-                                      </p:to>
-                                    </p:set>
-                                  </p:childTnLst>
-                                </p:cTn>
-                              </p:par>
-                            </p:childTnLst>
-                          </p:cTn>
-                        </p:par>
-                      </p:childTnLst>
-                    </p:cTn>
-                  </p:par>
-                  <p:par>
-                    <p:cTn id="17" fill="hold">
-                      <p:stCondLst>
-                        <p:cond delay="indefinite"/>
-                      </p:stCondLst>
-                      <p:childTnLst>
-                        <p:par>
-                          <p:cTn id="18" fill="hold">
-                            <p:stCondLst>
-                              <p:cond delay="0"/>
-                            </p:stCondLst>
-                            <p:childTnLst>
-                              <p:par>
-                                <p:cTn id="19" presetClass="entr" fill="hold" nodeType="clickEffect">
-                                  <p:stCondLst>
-                                    <p:cond delay="0"/>
-                                  </p:stCondLst>
-                                  <p:childTnLst>
-                                    <p:set>
-                                      <p:cBhvr>
-                                        <p:cTn id="20" dur="1" fill="hold">
-                                          <p:stCondLst>
-                                            <p:cond delay="0"/>
-                                          </p:stCondLst>
-                                        </p:cTn>
-                                        <p:tgtEl>
-                                          <p:spTgt spid="4">
-                                            <p:txEl>
-                                              <p:pRg st="7" end="7"/>
-                                            </p:txEl>
-                                          </p:spTgt>
-                                        </p:tgtEl>
-                                        <p:attrNameLst>
-                                          <p:attrName>style.visibility</p:attrName>
-                                        </p:attrNameLst>
-                                      </p:cBhvr>
-                                      <p:to>
-                                        <p:strVal val="visible"/>
-                                      </p:to>
-                                    </p:set>
-                                  </p:childTnLst>
-                                </p:cTn>
-                              </p:par>
-                            </p:childTnLst>
-                          </p:cTn>
-                        </p:par>
-                      </p:childTnLst>
-                    </p:cTn>
-                  </p:par>
-                  <p:par>
-                    <p:cTn id="21" fill="hold">
-                      <p:stCondLst>
-                        <p:cond delay="indefinite"/>
-                      </p:stCondLst>
-                      <p:childTnLst>
-                        <p:par>
-                          <p:cTn id="22" fill="hold">
-                            <p:stCondLst>
-                              <p:cond delay="0"/>
-                            </p:stCondLst>
-                            <p:childTnLst>
-                              <p:par>
-                                <p:cTn id="23" presetClass="entr" fill="hold" nodeType="clickEffect">
-                                  <p:stCondLst>
-                                    <p:cond delay="0"/>
-                                  </p:stCondLst>
-                                  <p:childTnLst>
-                                    <p:set>
-                                      <p:cBhvr>
-                                        <p:cTn id="24" dur="1" fill="hold">
-                                          <p:stCondLst>
-                                            <p:cond delay="0"/>
-                                          </p:stCondLst>
-                                        </p:cTn>
-                                        <p:tgtEl>
-                                          <p:spTgt spid="4">
-                                            <p:txEl>
-                                              <p:pRg st="9" end="9"/>
                                             </p:txEl>
                                           </p:spTgt>
                                         </p:tgtEl>

</xml_diff>